<commit_message>
Added explanation of why Floyd-Warshall is a dynamic programming algorithm
</commit_message>
<xml_diff>
--- a/Slides/Week 6 - Dynamic Programming, Floyd Warshall.pptx
+++ b/Slides/Week 6 - Dynamic Programming, Floyd Warshall.pptx
@@ -5,7 +5,7 @@
     <p:sldMasterId id="2147483729" r:id="rId1"/>
   </p:sldMasterIdLst>
   <p:notesMasterIdLst>
-    <p:notesMasterId r:id="rId33"/>
+    <p:notesMasterId r:id="rId35"/>
   </p:notesMasterIdLst>
   <p:sldIdLst>
     <p:sldId id="256" r:id="rId2"/>
@@ -29,16 +29,18 @@
     <p:sldId id="284" r:id="rId20"/>
     <p:sldId id="280" r:id="rId21"/>
     <p:sldId id="285" r:id="rId22"/>
-    <p:sldId id="279" r:id="rId23"/>
-    <p:sldId id="286" r:id="rId24"/>
-    <p:sldId id="287" r:id="rId25"/>
-    <p:sldId id="288" r:id="rId26"/>
-    <p:sldId id="289" r:id="rId27"/>
-    <p:sldId id="292" r:id="rId28"/>
-    <p:sldId id="291" r:id="rId29"/>
-    <p:sldId id="290" r:id="rId30"/>
-    <p:sldId id="294" r:id="rId31"/>
-    <p:sldId id="293" r:id="rId32"/>
+    <p:sldId id="295" r:id="rId23"/>
+    <p:sldId id="296" r:id="rId24"/>
+    <p:sldId id="279" r:id="rId25"/>
+    <p:sldId id="286" r:id="rId26"/>
+    <p:sldId id="287" r:id="rId27"/>
+    <p:sldId id="288" r:id="rId28"/>
+    <p:sldId id="289" r:id="rId29"/>
+    <p:sldId id="292" r:id="rId30"/>
+    <p:sldId id="291" r:id="rId31"/>
+    <p:sldId id="290" r:id="rId32"/>
+    <p:sldId id="294" r:id="rId33"/>
+    <p:sldId id="293" r:id="rId34"/>
   </p:sldIdLst>
   <p:sldSz cx="12192000" cy="6858000"/>
   <p:notesSz cx="6858000" cy="9144000"/>
@@ -239,7 +241,7 @@
           <a:p>
             <a:fld id="{F314420D-16BA-4EDC-9A71-800590EAD5A3}" type="datetimeFigureOut">
               <a:rPr lang="en-GB" smtClean="0"/>
-              <a:t>11/12/2015</a:t>
+              <a:t>04/01/2016</a:t>
             </a:fld>
             <a:endParaRPr lang="en-GB"/>
           </a:p>
@@ -398,7 +400,7 @@
           <a:p>
             <a:fld id="{29573B9A-66FB-4A63-BCD5-E140B9429FD2}" type="slidenum">
               <a:rPr lang="en-GB" smtClean="0"/>
-              <a:t>‹nr.›</a:t>
+              <a:t>‹#›</a:t>
             </a:fld>
             <a:endParaRPr lang="en-GB"/>
           </a:p>
@@ -802,7 +804,7 @@
           <a:p>
             <a:fld id="{29573B9A-66FB-4A63-BCD5-E140B9429FD2}" type="slidenum">
               <a:rPr lang="en-GB" smtClean="0"/>
-              <a:t>24</a:t>
+              <a:t>26</a:t>
             </a:fld>
             <a:endParaRPr lang="en-GB"/>
           </a:p>
@@ -922,7 +924,7 @@
           <a:p>
             <a:fld id="{29573B9A-66FB-4A63-BCD5-E140B9429FD2}" type="slidenum">
               <a:rPr lang="en-GB" smtClean="0"/>
-              <a:t>26</a:t>
+              <a:t>28</a:t>
             </a:fld>
             <a:endParaRPr lang="en-GB"/>
           </a:p>
@@ -1042,7 +1044,7 @@
           <a:p>
             <a:fld id="{29573B9A-66FB-4A63-BCD5-E140B9429FD2}" type="slidenum">
               <a:rPr lang="en-GB" smtClean="0"/>
-              <a:t>27</a:t>
+              <a:t>29</a:t>
             </a:fld>
             <a:endParaRPr lang="en-GB"/>
           </a:p>
@@ -1162,7 +1164,7 @@
           <a:p>
             <a:fld id="{29573B9A-66FB-4A63-BCD5-E140B9429FD2}" type="slidenum">
               <a:rPr lang="en-GB" smtClean="0"/>
-              <a:t>28</a:t>
+              <a:t>30</a:t>
             </a:fld>
             <a:endParaRPr lang="en-GB"/>
           </a:p>
@@ -1282,7 +1284,7 @@
           <a:p>
             <a:fld id="{29573B9A-66FB-4A63-BCD5-E140B9429FD2}" type="slidenum">
               <a:rPr lang="en-GB" smtClean="0"/>
-              <a:t>29</a:t>
+              <a:t>31</a:t>
             </a:fld>
             <a:endParaRPr lang="en-GB"/>
           </a:p>
@@ -1402,7 +1404,7 @@
           <a:p>
             <a:fld id="{29573B9A-66FB-4A63-BCD5-E140B9429FD2}" type="slidenum">
               <a:rPr lang="en-GB" smtClean="0"/>
-              <a:t>30</a:t>
+              <a:t>32</a:t>
             </a:fld>
             <a:endParaRPr lang="en-GB"/>
           </a:p>
@@ -2147,7 +2149,7 @@
           <a:p>
             <a:fld id="{EBA5BF6C-AF16-4C58-8955-5157BF3CF460}" type="datetime1">
               <a:rPr lang="en-GB" smtClean="0"/>
-              <a:t>11/12/2015</a:t>
+              <a:t>04/01/2016</a:t>
             </a:fld>
             <a:endParaRPr lang="en-GB"/>
           </a:p>
@@ -2193,7 +2195,7 @@
           <a:p>
             <a:fld id="{A3AAA307-BC5C-435E-9F75-3D6007B651A5}" type="slidenum">
               <a:rPr lang="en-GB" smtClean="0"/>
-              <a:t>‹nr.›</a:t>
+              <a:t>‹#›</a:t>
             </a:fld>
             <a:endParaRPr lang="en-GB"/>
           </a:p>
@@ -2402,7 +2404,7 @@
           <a:p>
             <a:fld id="{28754959-7583-41D4-A531-84ECF582A02F}" type="datetime1">
               <a:rPr lang="en-GB" smtClean="0"/>
-              <a:t>11/12/2015</a:t>
+              <a:t>04/01/2016</a:t>
             </a:fld>
             <a:endParaRPr lang="en-GB"/>
           </a:p>
@@ -2448,7 +2450,7 @@
           <a:p>
             <a:fld id="{A3AAA307-BC5C-435E-9F75-3D6007B651A5}" type="slidenum">
               <a:rPr lang="en-GB" smtClean="0"/>
-              <a:t>‹nr.›</a:t>
+              <a:t>‹#›</a:t>
             </a:fld>
             <a:endParaRPr lang="en-GB"/>
           </a:p>
@@ -2720,7 +2722,7 @@
           <a:p>
             <a:fld id="{2579CF84-8647-4BB0-98CB-E39DBFD9DC8C}" type="datetime1">
               <a:rPr lang="en-GB" smtClean="0"/>
-              <a:t>11/12/2015</a:t>
+              <a:t>04/01/2016</a:t>
             </a:fld>
             <a:endParaRPr lang="en-GB"/>
           </a:p>
@@ -2766,7 +2768,7 @@
           <a:p>
             <a:fld id="{A3AAA307-BC5C-435E-9F75-3D6007B651A5}" type="slidenum">
               <a:rPr lang="en-GB" smtClean="0"/>
-              <a:t>‹nr.›</a:t>
+              <a:t>‹#›</a:t>
             </a:fld>
             <a:endParaRPr lang="en-GB"/>
           </a:p>
@@ -3051,7 +3053,7 @@
           <a:p>
             <a:fld id="{6A61B992-C398-42F8-8105-DFF46194B470}" type="datetime1">
               <a:rPr lang="en-GB" smtClean="0"/>
-              <a:t>11/12/2015</a:t>
+              <a:t>04/01/2016</a:t>
             </a:fld>
             <a:endParaRPr lang="en-GB"/>
           </a:p>
@@ -3097,7 +3099,7 @@
           <a:p>
             <a:fld id="{A3AAA307-BC5C-435E-9F75-3D6007B651A5}" type="slidenum">
               <a:rPr lang="en-GB" smtClean="0"/>
-              <a:t>‹nr.›</a:t>
+              <a:t>‹#›</a:t>
             </a:fld>
             <a:endParaRPr lang="en-GB"/>
           </a:p>
@@ -3369,7 +3371,7 @@
           <a:p>
             <a:fld id="{735F25EF-2C32-49FF-A05C-AACCD6DB6B6B}" type="datetime1">
               <a:rPr lang="en-GB" smtClean="0"/>
-              <a:t>11/12/2015</a:t>
+              <a:t>04/01/2016</a:t>
             </a:fld>
             <a:endParaRPr lang="en-GB"/>
           </a:p>
@@ -3415,7 +3417,7 @@
           <a:p>
             <a:fld id="{A3AAA307-BC5C-435E-9F75-3D6007B651A5}" type="slidenum">
               <a:rPr lang="en-GB" smtClean="0"/>
-              <a:t>‹nr.›</a:t>
+              <a:t>‹#›</a:t>
             </a:fld>
             <a:endParaRPr lang="en-GB"/>
           </a:p>
@@ -3760,7 +3762,7 @@
           <a:p>
             <a:fld id="{29E0FEDD-8B46-4AB8-8509-00A28AB84484}" type="datetime1">
               <a:rPr lang="en-GB" smtClean="0"/>
-              <a:t>11/12/2015</a:t>
+              <a:t>04/01/2016</a:t>
             </a:fld>
             <a:endParaRPr lang="en-GB"/>
           </a:p>
@@ -3806,7 +3808,7 @@
           <a:p>
             <a:fld id="{A3AAA307-BC5C-435E-9F75-3D6007B651A5}" type="slidenum">
               <a:rPr lang="en-GB" smtClean="0"/>
-              <a:t>‹nr.›</a:t>
+              <a:t>‹#›</a:t>
             </a:fld>
             <a:endParaRPr lang="en-GB"/>
           </a:p>
@@ -3934,7 +3936,7 @@
           <a:p>
             <a:fld id="{DBEF859E-FC17-4049-B5D8-0DB1DB648A1C}" type="datetime1">
               <a:rPr lang="en-GB" smtClean="0"/>
-              <a:t>11/12/2015</a:t>
+              <a:t>04/01/2016</a:t>
             </a:fld>
             <a:endParaRPr lang="en-GB"/>
           </a:p>
@@ -3980,7 +3982,7 @@
           <a:p>
             <a:fld id="{A3AAA307-BC5C-435E-9F75-3D6007B651A5}" type="slidenum">
               <a:rPr lang="en-GB" smtClean="0"/>
-              <a:t>‹nr.›</a:t>
+              <a:t>‹#›</a:t>
             </a:fld>
             <a:endParaRPr lang="en-GB"/>
           </a:p>
@@ -4118,7 +4120,7 @@
           <a:p>
             <a:fld id="{31601F83-63BF-475D-9B29-D444390134B0}" type="datetime1">
               <a:rPr lang="en-GB" smtClean="0"/>
-              <a:t>11/12/2015</a:t>
+              <a:t>04/01/2016</a:t>
             </a:fld>
             <a:endParaRPr lang="en-GB"/>
           </a:p>
@@ -4164,7 +4166,7 @@
           <a:p>
             <a:fld id="{A3AAA307-BC5C-435E-9F75-3D6007B651A5}" type="slidenum">
               <a:rPr lang="en-GB" smtClean="0"/>
-              <a:t>‹nr.›</a:t>
+              <a:t>‹#›</a:t>
             </a:fld>
             <a:endParaRPr lang="en-GB"/>
           </a:p>
@@ -4292,7 +4294,7 @@
           <a:p>
             <a:fld id="{0C3CD51F-4875-411B-AE14-AC6BE17149BE}" type="datetime1">
               <a:rPr lang="en-GB" smtClean="0"/>
-              <a:t>11/12/2015</a:t>
+              <a:t>04/01/2016</a:t>
             </a:fld>
             <a:endParaRPr lang="en-GB"/>
           </a:p>
@@ -4338,7 +4340,7 @@
           <a:p>
             <a:fld id="{A3AAA307-BC5C-435E-9F75-3D6007B651A5}" type="slidenum">
               <a:rPr lang="en-GB" smtClean="0"/>
-              <a:t>‹nr.›</a:t>
+              <a:t>‹#›</a:t>
             </a:fld>
             <a:endParaRPr lang="en-GB"/>
           </a:p>
@@ -4543,7 +4545,7 @@
           <a:p>
             <a:fld id="{D7A13E29-F9DA-4235-B179-6801D5C335E0}" type="datetime1">
               <a:rPr lang="en-GB" smtClean="0"/>
-              <a:t>11/12/2015</a:t>
+              <a:t>04/01/2016</a:t>
             </a:fld>
             <a:endParaRPr lang="en-GB"/>
           </a:p>
@@ -4589,7 +4591,7 @@
           <a:p>
             <a:fld id="{A3AAA307-BC5C-435E-9F75-3D6007B651A5}" type="slidenum">
               <a:rPr lang="en-GB" smtClean="0"/>
-              <a:t>‹nr.›</a:t>
+              <a:t>‹#›</a:t>
             </a:fld>
             <a:endParaRPr lang="en-GB"/>
           </a:p>
@@ -4779,7 +4781,7 @@
           <a:p>
             <a:fld id="{17E7B115-DA76-4A15-B0DB-1E0942A758E6}" type="datetime1">
               <a:rPr lang="en-GB" smtClean="0"/>
-              <a:t>11/12/2015</a:t>
+              <a:t>04/01/2016</a:t>
             </a:fld>
             <a:endParaRPr lang="en-GB"/>
           </a:p>
@@ -4825,7 +4827,7 @@
           <a:p>
             <a:fld id="{A3AAA307-BC5C-435E-9F75-3D6007B651A5}" type="slidenum">
               <a:rPr lang="en-GB" smtClean="0"/>
-              <a:t>‹nr.›</a:t>
+              <a:t>‹#›</a:t>
             </a:fld>
             <a:endParaRPr lang="en-GB"/>
           </a:p>
@@ -5157,7 +5159,7 @@
           <a:p>
             <a:fld id="{E9C155A6-10E7-4AE0-A978-61287BEECA4C}" type="datetime1">
               <a:rPr lang="en-GB" smtClean="0"/>
-              <a:t>11/12/2015</a:t>
+              <a:t>04/01/2016</a:t>
             </a:fld>
             <a:endParaRPr lang="en-GB"/>
           </a:p>
@@ -5203,7 +5205,7 @@
           <a:p>
             <a:fld id="{A3AAA307-BC5C-435E-9F75-3D6007B651A5}" type="slidenum">
               <a:rPr lang="en-GB" smtClean="0"/>
-              <a:t>‹nr.›</a:t>
+              <a:t>‹#›</a:t>
             </a:fld>
             <a:endParaRPr lang="en-GB"/>
           </a:p>
@@ -5284,7 +5286,7 @@
           <a:p>
             <a:fld id="{73961DA1-B789-43DA-B41F-367E45E14A87}" type="datetime1">
               <a:rPr lang="en-GB" smtClean="0"/>
-              <a:t>11/12/2015</a:t>
+              <a:t>04/01/2016</a:t>
             </a:fld>
             <a:endParaRPr lang="en-GB"/>
           </a:p>
@@ -5330,7 +5332,7 @@
           <a:p>
             <a:fld id="{A3AAA307-BC5C-435E-9F75-3D6007B651A5}" type="slidenum">
               <a:rPr lang="en-GB" smtClean="0"/>
-              <a:t>‹nr.›</a:t>
+              <a:t>‹#›</a:t>
             </a:fld>
             <a:endParaRPr lang="en-GB"/>
           </a:p>
@@ -5383,7 +5385,7 @@
           <a:p>
             <a:fld id="{DA1BD0E5-CF08-4746-888E-2D733D556074}" type="datetime1">
               <a:rPr lang="en-GB" smtClean="0"/>
-              <a:t>11/12/2015</a:t>
+              <a:t>04/01/2016</a:t>
             </a:fld>
             <a:endParaRPr lang="en-GB"/>
           </a:p>
@@ -5429,7 +5431,7 @@
           <a:p>
             <a:fld id="{A3AAA307-BC5C-435E-9F75-3D6007B651A5}" type="slidenum">
               <a:rPr lang="en-GB" smtClean="0"/>
-              <a:t>‹nr.›</a:t>
+              <a:t>‹#›</a:t>
             </a:fld>
             <a:endParaRPr lang="en-GB"/>
           </a:p>
@@ -5642,7 +5644,7 @@
           <a:p>
             <a:fld id="{91A550A3-096A-496C-87AD-3A39D20C628E}" type="datetime1">
               <a:rPr lang="en-GB" smtClean="0"/>
-              <a:t>11/12/2015</a:t>
+              <a:t>04/01/2016</a:t>
             </a:fld>
             <a:endParaRPr lang="en-GB"/>
           </a:p>
@@ -5688,7 +5690,7 @@
           <a:p>
             <a:fld id="{A3AAA307-BC5C-435E-9F75-3D6007B651A5}" type="slidenum">
               <a:rPr lang="en-GB" smtClean="0"/>
-              <a:t>‹nr.›</a:t>
+              <a:t>‹#›</a:t>
             </a:fld>
             <a:endParaRPr lang="en-GB"/>
           </a:p>
@@ -5909,7 +5911,7 @@
           <a:p>
             <a:fld id="{9A7CFD0D-77B1-493B-A7CA-4E8359C26366}" type="datetime1">
               <a:rPr lang="en-GB" smtClean="0"/>
-              <a:t>11/12/2015</a:t>
+              <a:t>04/01/2016</a:t>
             </a:fld>
             <a:endParaRPr lang="en-GB"/>
           </a:p>
@@ -5955,7 +5957,7 @@
           <a:p>
             <a:fld id="{A3AAA307-BC5C-435E-9F75-3D6007B651A5}" type="slidenum">
               <a:rPr lang="en-GB" smtClean="0"/>
-              <a:t>‹nr.›</a:t>
+              <a:t>‹#›</a:t>
             </a:fld>
             <a:endParaRPr lang="en-GB"/>
           </a:p>
@@ -6658,7 +6660,7 @@
           <a:p>
             <a:fld id="{EF7A9A45-2E76-4088-871F-04CACEBEB6E2}" type="datetime1">
               <a:rPr lang="en-GB" smtClean="0"/>
-              <a:t>11/12/2015</a:t>
+              <a:t>04/01/2016</a:t>
             </a:fld>
             <a:endParaRPr lang="en-GB"/>
           </a:p>
@@ -6740,7 +6742,7 @@
           <a:p>
             <a:fld id="{A3AAA307-BC5C-435E-9F75-3D6007B651A5}" type="slidenum">
               <a:rPr lang="en-GB" smtClean="0"/>
-              <a:t>‹nr.›</a:t>
+              <a:t>‹#›</a:t>
             </a:fld>
             <a:endParaRPr lang="en-GB"/>
           </a:p>
@@ -7322,13 +7324,6 @@
   <p:clrMapOvr>
     <a:masterClrMapping/>
   </p:clrMapOvr>
-  <p:timing>
-    <p:tnLst>
-      <p:par>
-        <p:cTn id="1" dur="indefinite" restart="never" nodeType="tmRoot"/>
-      </p:par>
-    </p:tnLst>
-  </p:timing>
 </p:sld>
 </file>
 
@@ -7996,13 +7991,6 @@
   <p:clrMapOvr>
     <a:masterClrMapping/>
   </p:clrMapOvr>
-  <p:timing>
-    <p:tnLst>
-      <p:par>
-        <p:cTn id="1" dur="indefinite" restart="never" nodeType="tmRoot"/>
-      </p:par>
-    </p:tnLst>
-  </p:timing>
 </p:sld>
 </file>
 
@@ -8614,14 +8602,7 @@
                 <a:latin typeface="Consolas" panose="020B0609020204030204" pitchFamily="49" charset="0"/>
                 <a:cs typeface="Consolas" panose="020B0609020204030204" pitchFamily="49" charset="0"/>
               </a:rPr>
-              <a:t> </a:t>
-            </a:r>
-            <a:r>
-              <a:rPr lang="nl-NL" sz="1600" dirty="0" smtClean="0">
-                <a:latin typeface="Consolas" panose="020B0609020204030204" pitchFamily="49" charset="0"/>
-                <a:cs typeface="Consolas" panose="020B0609020204030204" pitchFamily="49" charset="0"/>
-              </a:rPr>
-              <a:t>  return </a:t>
+              <a:t>   return </a:t>
             </a:r>
             <a:r>
               <a:rPr lang="nl-NL" sz="1600" dirty="0" err="1">
@@ -8647,13 +8628,6 @@
   <p:clrMapOvr>
     <a:masterClrMapping/>
   </p:clrMapOvr>
-  <p:timing>
-    <p:tnLst>
-      <p:par>
-        <p:cTn id="1" dur="indefinite" restart="never" nodeType="tmRoot"/>
-      </p:par>
-    </p:tnLst>
-  </p:timing>
 </p:sld>
 </file>
 
@@ -8771,13 +8745,6 @@
   <p:clrMapOvr>
     <a:masterClrMapping/>
   </p:clrMapOvr>
-  <p:timing>
-    <p:tnLst>
-      <p:par>
-        <p:cTn id="1" dur="indefinite" restart="never" nodeType="tmRoot"/>
-      </p:par>
-    </p:tnLst>
-  </p:timing>
 </p:sld>
 </file>
 
@@ -9265,13 +9232,6 @@
   <p:clrMapOvr>
     <a:masterClrMapping/>
   </p:clrMapOvr>
-  <p:timing>
-    <p:tnLst>
-      <p:par>
-        <p:cTn id="1" dur="indefinite" restart="never" nodeType="tmRoot"/>
-      </p:par>
-    </p:tnLst>
-  </p:timing>
 </p:sld>
 </file>
 
@@ -9327,8 +9287,8 @@
           </a:p>
         </p:txBody>
       </p:sp>
-      <mc:AlternateContent xmlns:mc="http://schemas.openxmlformats.org/markup-compatibility/2006">
-        <mc:Choice xmlns:a14="http://schemas.microsoft.com/office/drawing/2010/main" Requires="a14">
+      <mc:AlternateContent xmlns:mc="http://schemas.openxmlformats.org/markup-compatibility/2006" xmlns:a14="http://schemas.microsoft.com/office/drawing/2010/main">
+        <mc:Choice Requires="a14">
           <p:sp>
             <p:nvSpPr>
               <p:cNvPr id="3" name="Tijdelijke aanduiding voor inhoud 2"/>
@@ -9745,7 +9705,7 @@
             </p:txBody>
           </p:sp>
         </mc:Choice>
-        <mc:Fallback>
+        <mc:Fallback xmlns="">
           <p:sp>
             <p:nvSpPr>
               <p:cNvPr id="3" name="Tijdelijke aanduiding voor inhoud 2"/>
@@ -9812,13 +9772,6 @@
   <p:clrMapOvr>
     <a:masterClrMapping/>
   </p:clrMapOvr>
-  <p:timing>
-    <p:tnLst>
-      <p:par>
-        <p:cTn id="1" dur="indefinite" restart="never" nodeType="tmRoot"/>
-      </p:par>
-    </p:tnLst>
-  </p:timing>
 </p:sld>
 </file>
 
@@ -9874,8 +9827,8 @@
           </a:p>
         </p:txBody>
       </p:sp>
-      <mc:AlternateContent xmlns:mc="http://schemas.openxmlformats.org/markup-compatibility/2006">
-        <mc:Choice xmlns:a14="http://schemas.microsoft.com/office/drawing/2010/main" Requires="a14">
+      <mc:AlternateContent xmlns:mc="http://schemas.openxmlformats.org/markup-compatibility/2006" xmlns:a14="http://schemas.microsoft.com/office/drawing/2010/main">
+        <mc:Choice Requires="a14">
           <p:sp>
             <p:nvSpPr>
               <p:cNvPr id="3" name="Tijdelijke aanduiding voor inhoud 2"/>
@@ -10281,7 +10234,7 @@
             </p:txBody>
           </p:sp>
         </mc:Choice>
-        <mc:Fallback>
+        <mc:Fallback xmlns="">
           <p:sp>
             <p:nvSpPr>
               <p:cNvPr id="3" name="Tijdelijke aanduiding voor inhoud 2"/>
@@ -10348,13 +10301,6 @@
   <p:clrMapOvr>
     <a:masterClrMapping/>
   </p:clrMapOvr>
-  <p:timing>
-    <p:tnLst>
-      <p:par>
-        <p:cTn id="1" dur="indefinite" restart="never" nodeType="tmRoot"/>
-      </p:par>
-    </p:tnLst>
-  </p:timing>
 </p:sld>
 </file>
 
@@ -10434,8 +10380,8 @@
           </a:p>
         </p:txBody>
       </p:sp>
-      <mc:AlternateContent xmlns:mc="http://schemas.openxmlformats.org/markup-compatibility/2006">
-        <mc:Choice xmlns:a14="http://schemas.microsoft.com/office/drawing/2010/main" Requires="a14">
+      <mc:AlternateContent xmlns:mc="http://schemas.openxmlformats.org/markup-compatibility/2006" xmlns:a14="http://schemas.microsoft.com/office/drawing/2010/main">
+        <mc:Choice Requires="a14">
           <p:sp>
             <p:nvSpPr>
               <p:cNvPr id="3" name="Tijdelijke aanduiding voor inhoud 2"/>
@@ -10570,7 +10516,7 @@
             </p:txBody>
           </p:sp>
         </mc:Choice>
-        <mc:Fallback>
+        <mc:Fallback xmlns="">
           <p:sp>
             <p:nvSpPr>
               <p:cNvPr id="3" name="Tijdelijke aanduiding voor inhoud 2"/>
@@ -10637,13 +10583,6 @@
   <p:clrMapOvr>
     <a:masterClrMapping/>
   </p:clrMapOvr>
-  <p:timing>
-    <p:tnLst>
-      <p:par>
-        <p:cTn id="1" dur="indefinite" restart="never" nodeType="tmRoot"/>
-      </p:par>
-    </p:tnLst>
-  </p:timing>
 </p:sld>
 </file>
 
@@ -10723,8 +10662,8 @@
           </a:p>
         </p:txBody>
       </p:sp>
-      <mc:AlternateContent xmlns:mc="http://schemas.openxmlformats.org/markup-compatibility/2006">
-        <mc:Choice xmlns:a14="http://schemas.microsoft.com/office/drawing/2010/main" Requires="a14">
+      <mc:AlternateContent xmlns:mc="http://schemas.openxmlformats.org/markup-compatibility/2006" xmlns:a14="http://schemas.microsoft.com/office/drawing/2010/main">
+        <mc:Choice Requires="a14">
           <p:sp>
             <p:nvSpPr>
               <p:cNvPr id="3" name="Tijdelijke aanduiding voor inhoud 2"/>
@@ -11138,7 +11077,7 @@
             </p:txBody>
           </p:sp>
         </mc:Choice>
-        <mc:Fallback>
+        <mc:Fallback xmlns="">
           <p:sp>
             <p:nvSpPr>
               <p:cNvPr id="3" name="Tijdelijke aanduiding voor inhoud 2"/>
@@ -11209,13 +11148,6 @@
   <p:clrMapOvr>
     <a:masterClrMapping/>
   </p:clrMapOvr>
-  <p:timing>
-    <p:tnLst>
-      <p:par>
-        <p:cTn id="1" dur="indefinite" restart="never" nodeType="tmRoot"/>
-      </p:par>
-    </p:tnLst>
-  </p:timing>
 </p:sld>
 </file>
 
@@ -11395,13 +11327,6 @@
   <p:clrMapOvr>
     <a:masterClrMapping/>
   </p:clrMapOvr>
-  <p:timing>
-    <p:tnLst>
-      <p:par>
-        <p:cTn id="1" dur="indefinite" restart="never" nodeType="tmRoot"/>
-      </p:par>
-    </p:tnLst>
-  </p:timing>
 </p:sld>
 </file>
 
@@ -11457,8 +11382,8 @@
           </a:p>
         </p:txBody>
       </p:sp>
-      <mc:AlternateContent xmlns:mc="http://schemas.openxmlformats.org/markup-compatibility/2006">
-        <mc:Choice xmlns:a14="http://schemas.microsoft.com/office/drawing/2010/main" Requires="a14">
+      <mc:AlternateContent xmlns:mc="http://schemas.openxmlformats.org/markup-compatibility/2006" xmlns:a14="http://schemas.microsoft.com/office/drawing/2010/main">
+        <mc:Choice Requires="a14">
           <p:sp>
             <p:nvSpPr>
               <p:cNvPr id="3" name="Tijdelijke aanduiding voor inhoud 2"/>
@@ -11792,7 +11717,7 @@
             </p:txBody>
           </p:sp>
         </mc:Choice>
-        <mc:Fallback>
+        <mc:Fallback xmlns="">
           <p:sp>
             <p:nvSpPr>
               <p:cNvPr id="3" name="Tijdelijke aanduiding voor inhoud 2"/>
@@ -11863,13 +11788,6 @@
   <p:clrMapOvr>
     <a:masterClrMapping/>
   </p:clrMapOvr>
-  <p:timing>
-    <p:tnLst>
-      <p:par>
-        <p:cTn id="1" dur="indefinite" restart="never" nodeType="tmRoot"/>
-      </p:par>
-    </p:tnLst>
-  </p:timing>
 </p:sld>
 </file>
 
@@ -11925,8 +11843,8 @@
           </a:p>
         </p:txBody>
       </p:sp>
-      <mc:AlternateContent xmlns:mc="http://schemas.openxmlformats.org/markup-compatibility/2006">
-        <mc:Choice xmlns:a14="http://schemas.microsoft.com/office/drawing/2010/main" Requires="a14">
+      <mc:AlternateContent xmlns:mc="http://schemas.openxmlformats.org/markup-compatibility/2006" xmlns:a14="http://schemas.microsoft.com/office/drawing/2010/main">
+        <mc:Choice Requires="a14">
           <p:sp>
             <p:nvSpPr>
               <p:cNvPr id="3" name="Tijdelijke aanduiding voor inhoud 2"/>
@@ -12847,7 +12765,7 @@
             </p:txBody>
           </p:sp>
         </mc:Choice>
-        <mc:Fallback>
+        <mc:Fallback xmlns="">
           <p:sp>
             <p:nvSpPr>
               <p:cNvPr id="3" name="Tijdelijke aanduiding voor inhoud 2"/>
@@ -12918,13 +12836,6 @@
   <p:clrMapOvr>
     <a:masterClrMapping/>
   </p:clrMapOvr>
-  <p:timing>
-    <p:tnLst>
-      <p:par>
-        <p:cTn id="1" dur="indefinite" restart="never" nodeType="tmRoot"/>
-      </p:par>
-    </p:tnLst>
-  </p:timing>
 </p:sld>
 </file>
 
@@ -12947,6 +12858,985 @@
       </p:grpSpPr>
       <p:sp>
         <p:nvSpPr>
+          <p:cNvPr id="2" name="Title 1"/>
+          <p:cNvSpPr>
+            <a:spLocks noGrp="1"/>
+          </p:cNvSpPr>
+          <p:nvPr>
+            <p:ph type="title"/>
+          </p:nvPr>
+        </p:nvSpPr>
+        <p:spPr/>
+        <p:txBody>
+          <a:bodyPr>
+            <a:normAutofit/>
+          </a:bodyPr>
+          <a:lstStyle/>
+          <a:p>
+            <a:r>
+              <a:rPr lang="en-US" dirty="0" smtClean="0"/>
+              <a:t>Floyd-</a:t>
+            </a:r>
+            <a:r>
+              <a:rPr lang="en-US" dirty="0" err="1" smtClean="0"/>
+              <a:t>Warshall</a:t>
+            </a:r>
+            <a:r>
+              <a:rPr lang="en-US" dirty="0" smtClean="0"/>
+              <a:t> and dynamic programming</a:t>
+            </a:r>
+            <a:endParaRPr lang="it-IT" dirty="0"/>
+          </a:p>
+        </p:txBody>
+      </p:sp>
+      <p:sp>
+        <p:nvSpPr>
+          <p:cNvPr id="3" name="Content Placeholder 2"/>
+          <p:cNvSpPr>
+            <a:spLocks noGrp="1"/>
+          </p:cNvSpPr>
+          <p:nvPr>
+            <p:ph idx="1"/>
+          </p:nvPr>
+        </p:nvSpPr>
+        <p:spPr>
+          <a:xfrm>
+            <a:off x="677334" y="3478826"/>
+            <a:ext cx="8596668" cy="2562536"/>
+          </a:xfrm>
+        </p:spPr>
+        <p:txBody>
+          <a:bodyPr/>
+          <a:lstStyle/>
+          <a:p>
+            <a:pPr marL="0" indent="0">
+              <a:buNone/>
+            </a:pPr>
+            <a:r>
+              <a:rPr lang="en-US" dirty="0" smtClean="0"/>
+              <a:t>We are </a:t>
+            </a:r>
+            <a:r>
+              <a:rPr lang="en-US" dirty="0" err="1" smtClean="0"/>
+              <a:t>recomputing</a:t>
+            </a:r>
+            <a:r>
+              <a:rPr lang="en-US" dirty="0" smtClean="0"/>
+              <a:t> the same paths multiple times, for example:</a:t>
+            </a:r>
+          </a:p>
+          <a:p>
+            <a:r>
+              <a:rPr lang="en-US" dirty="0" err="1"/>
+              <a:t>sp</a:t>
+            </a:r>
+            <a:r>
+              <a:rPr lang="en-US" dirty="0"/>
+              <a:t>(1,2,4) = min(</a:t>
+            </a:r>
+            <a:r>
+              <a:rPr lang="en-US" dirty="0" err="1"/>
+              <a:t>sp</a:t>
+            </a:r>
+            <a:r>
+              <a:rPr lang="en-US" dirty="0"/>
+              <a:t>(1,2,3),</a:t>
+            </a:r>
+            <a:r>
+              <a:rPr lang="en-US" dirty="0" err="1"/>
+              <a:t>sp</a:t>
+            </a:r>
+            <a:r>
+              <a:rPr lang="en-US" dirty="0"/>
+              <a:t>(1,4,3) + </a:t>
+            </a:r>
+            <a:r>
+              <a:rPr lang="en-US" dirty="0" err="1"/>
+              <a:t>sp</a:t>
+            </a:r>
+            <a:r>
+              <a:rPr lang="en-US"/>
+              <a:t>(4,2,3</a:t>
+            </a:r>
+            <a:r>
+              <a:rPr lang="en-US" smtClean="0"/>
+              <a:t>))</a:t>
+            </a:r>
+          </a:p>
+          <a:p>
+            <a:r>
+              <a:rPr lang="en-US" dirty="0" err="1" smtClean="0"/>
+              <a:t>sp</a:t>
+            </a:r>
+            <a:r>
+              <a:rPr lang="en-US" dirty="0" smtClean="0"/>
+              <a:t>(1,2,3) = min(</a:t>
+            </a:r>
+            <a:r>
+              <a:rPr lang="en-US" dirty="0" err="1" smtClean="0"/>
+              <a:t>sp</a:t>
+            </a:r>
+            <a:r>
+              <a:rPr lang="en-US" dirty="0" smtClean="0"/>
+              <a:t>(1,2,2),</a:t>
+            </a:r>
+            <a:r>
+              <a:rPr lang="en-US" dirty="0" err="1" smtClean="0">
+                <a:solidFill>
+                  <a:srgbClr val="FF0000"/>
+                </a:solidFill>
+              </a:rPr>
+              <a:t>sp</a:t>
+            </a:r>
+            <a:r>
+              <a:rPr lang="en-US" dirty="0" smtClean="0">
+                <a:solidFill>
+                  <a:srgbClr val="FF0000"/>
+                </a:solidFill>
+              </a:rPr>
+              <a:t>(1,3,2) </a:t>
+            </a:r>
+            <a:r>
+              <a:rPr lang="en-US" dirty="0" smtClean="0"/>
+              <a:t>+ </a:t>
+            </a:r>
+            <a:r>
+              <a:rPr lang="en-US" dirty="0" err="1" smtClean="0"/>
+              <a:t>sp</a:t>
+            </a:r>
+            <a:r>
+              <a:rPr lang="en-US" dirty="0" smtClean="0"/>
+              <a:t>(3,2,2))</a:t>
+            </a:r>
+          </a:p>
+          <a:p>
+            <a:r>
+              <a:rPr lang="en-US" dirty="0" err="1" smtClean="0"/>
+              <a:t>sp</a:t>
+            </a:r>
+            <a:r>
+              <a:rPr lang="en-US" dirty="0" smtClean="0"/>
+              <a:t>(1,4,3) = min(</a:t>
+            </a:r>
+            <a:r>
+              <a:rPr lang="en-US" dirty="0" err="1" smtClean="0"/>
+              <a:t>sp</a:t>
+            </a:r>
+            <a:r>
+              <a:rPr lang="en-US" dirty="0" smtClean="0"/>
+              <a:t>(1,4,2),</a:t>
+            </a:r>
+            <a:r>
+              <a:rPr lang="en-US" dirty="0" err="1" smtClean="0">
+                <a:solidFill>
+                  <a:srgbClr val="FF0000"/>
+                </a:solidFill>
+              </a:rPr>
+              <a:t>sp</a:t>
+            </a:r>
+            <a:r>
+              <a:rPr lang="en-US" dirty="0" smtClean="0">
+                <a:solidFill>
+                  <a:srgbClr val="FF0000"/>
+                </a:solidFill>
+              </a:rPr>
+              <a:t>(1,3,2) </a:t>
+            </a:r>
+            <a:r>
+              <a:rPr lang="en-US" dirty="0" smtClean="0"/>
+              <a:t>+ </a:t>
+            </a:r>
+            <a:r>
+              <a:rPr lang="en-US" dirty="0" err="1" smtClean="0"/>
+              <a:t>sp</a:t>
+            </a:r>
+            <a:r>
+              <a:rPr lang="en-US" dirty="0" smtClean="0"/>
+              <a:t>(3,4,2))</a:t>
+            </a:r>
+          </a:p>
+        </p:txBody>
+      </p:sp>
+      <p:sp>
+        <p:nvSpPr>
+          <p:cNvPr id="4" name="Footer Placeholder 3"/>
+          <p:cNvSpPr>
+            <a:spLocks noGrp="1"/>
+          </p:cNvSpPr>
+          <p:nvPr>
+            <p:ph type="ftr" sz="quarter" idx="11"/>
+          </p:nvPr>
+        </p:nvSpPr>
+        <p:spPr/>
+        <p:txBody>
+          <a:bodyPr/>
+          <a:lstStyle/>
+          <a:p>
+            <a:r>
+              <a:rPr lang="it-IT" smtClean="0"/>
+              <a:t>INFDEV026A - G. Costantini, F. Di Giacomo, G. Maggiore</a:t>
+            </a:r>
+            <a:endParaRPr lang="en-GB"/>
+          </a:p>
+        </p:txBody>
+      </p:sp>
+      <p:grpSp>
+        <p:nvGrpSpPr>
+          <p:cNvPr id="26" name="Group 25"/>
+          <p:cNvGrpSpPr/>
+          <p:nvPr/>
+        </p:nvGrpSpPr>
+        <p:grpSpPr>
+          <a:xfrm>
+            <a:off x="2812025" y="1775154"/>
+            <a:ext cx="3687643" cy="1514635"/>
+            <a:chOff x="2812025" y="1775154"/>
+            <a:chExt cx="3687643" cy="1514635"/>
+          </a:xfrm>
+        </p:grpSpPr>
+        <p:sp>
+          <p:nvSpPr>
+            <p:cNvPr id="20" name="TextBox 19"/>
+            <p:cNvSpPr txBox="1"/>
+            <p:nvPr/>
+          </p:nvSpPr>
+          <p:spPr>
+            <a:xfrm>
+              <a:off x="3974354" y="2920457"/>
+              <a:ext cx="487369" cy="369332"/>
+            </a:xfrm>
+            <a:prstGeom prst="rect">
+              <a:avLst/>
+            </a:prstGeom>
+            <a:noFill/>
+          </p:spPr>
+          <p:txBody>
+            <a:bodyPr wrap="square" rtlCol="0">
+              <a:spAutoFit/>
+            </a:bodyPr>
+            <a:lstStyle/>
+            <a:p>
+              <a:pPr algn="ctr"/>
+              <a:r>
+                <a:rPr lang="en-US" dirty="0" smtClean="0"/>
+                <a:t>10</a:t>
+              </a:r>
+              <a:endParaRPr lang="it-IT" dirty="0"/>
+            </a:p>
+          </p:txBody>
+        </p:sp>
+        <p:grpSp>
+          <p:nvGrpSpPr>
+            <p:cNvPr id="25" name="Group 24"/>
+            <p:cNvGrpSpPr/>
+            <p:nvPr/>
+          </p:nvGrpSpPr>
+          <p:grpSpPr>
+            <a:xfrm>
+              <a:off x="2812025" y="1775154"/>
+              <a:ext cx="3687643" cy="1321423"/>
+              <a:chOff x="1504335" y="1765907"/>
+              <a:chExt cx="3687643" cy="1321423"/>
+            </a:xfrm>
+          </p:grpSpPr>
+          <p:sp>
+            <p:nvSpPr>
+              <p:cNvPr id="5" name="Oval 4"/>
+              <p:cNvSpPr/>
+              <p:nvPr/>
+            </p:nvSpPr>
+            <p:spPr>
+              <a:xfrm>
+                <a:off x="1504335" y="2674375"/>
+                <a:ext cx="432620" cy="412955"/>
+              </a:xfrm>
+              <a:prstGeom prst="ellipse">
+                <a:avLst/>
+              </a:prstGeom>
+              <a:solidFill>
+                <a:schemeClr val="bg1"/>
+              </a:solidFill>
+            </p:spPr>
+            <p:style>
+              <a:lnRef idx="2">
+                <a:schemeClr val="accent1">
+                  <a:shade val="50000"/>
+                </a:schemeClr>
+              </a:lnRef>
+              <a:fillRef idx="1">
+                <a:schemeClr val="accent1"/>
+              </a:fillRef>
+              <a:effectRef idx="0">
+                <a:schemeClr val="accent1"/>
+              </a:effectRef>
+              <a:fontRef idx="minor">
+                <a:schemeClr val="lt1"/>
+              </a:fontRef>
+            </p:style>
+            <p:txBody>
+              <a:bodyPr rtlCol="0" anchor="ctr"/>
+              <a:lstStyle/>
+              <a:p>
+                <a:pPr algn="ctr"/>
+                <a:r>
+                  <a:rPr lang="en-US" dirty="0">
+                    <a:solidFill>
+                      <a:schemeClr val="tx1"/>
+                    </a:solidFill>
+                  </a:rPr>
+                  <a:t>1</a:t>
+                </a:r>
+                <a:endParaRPr lang="it-IT" dirty="0">
+                  <a:solidFill>
+                    <a:schemeClr val="tx1"/>
+                  </a:solidFill>
+                </a:endParaRPr>
+              </a:p>
+            </p:txBody>
+          </p:sp>
+          <p:sp>
+            <p:nvSpPr>
+              <p:cNvPr id="6" name="Oval 5"/>
+              <p:cNvSpPr/>
+              <p:nvPr/>
+            </p:nvSpPr>
+            <p:spPr>
+              <a:xfrm>
+                <a:off x="3826140" y="2674375"/>
+                <a:ext cx="432620" cy="412955"/>
+              </a:xfrm>
+              <a:prstGeom prst="ellipse">
+                <a:avLst/>
+              </a:prstGeom>
+              <a:solidFill>
+                <a:schemeClr val="bg1"/>
+              </a:solidFill>
+            </p:spPr>
+            <p:style>
+              <a:lnRef idx="2">
+                <a:schemeClr val="accent1">
+                  <a:shade val="50000"/>
+                </a:schemeClr>
+              </a:lnRef>
+              <a:fillRef idx="1">
+                <a:schemeClr val="accent1"/>
+              </a:fillRef>
+              <a:effectRef idx="0">
+                <a:schemeClr val="accent1"/>
+              </a:effectRef>
+              <a:fontRef idx="minor">
+                <a:schemeClr val="lt1"/>
+              </a:fontRef>
+            </p:style>
+            <p:txBody>
+              <a:bodyPr rtlCol="0" anchor="ctr"/>
+              <a:lstStyle/>
+              <a:p>
+                <a:pPr algn="ctr"/>
+                <a:r>
+                  <a:rPr lang="en-US" dirty="0" smtClean="0">
+                    <a:solidFill>
+                      <a:schemeClr val="tx1"/>
+                    </a:solidFill>
+                  </a:rPr>
+                  <a:t>2</a:t>
+                </a:r>
+                <a:endParaRPr lang="it-IT" dirty="0">
+                  <a:solidFill>
+                    <a:schemeClr val="tx1"/>
+                  </a:solidFill>
+                </a:endParaRPr>
+              </a:p>
+            </p:txBody>
+          </p:sp>
+          <p:sp>
+            <p:nvSpPr>
+              <p:cNvPr id="7" name="Oval 6"/>
+              <p:cNvSpPr/>
+              <p:nvPr/>
+            </p:nvSpPr>
+            <p:spPr>
+              <a:xfrm>
+                <a:off x="2694039" y="1922207"/>
+                <a:ext cx="432620" cy="412955"/>
+              </a:xfrm>
+              <a:prstGeom prst="ellipse">
+                <a:avLst/>
+              </a:prstGeom>
+              <a:solidFill>
+                <a:schemeClr val="bg1"/>
+              </a:solidFill>
+            </p:spPr>
+            <p:style>
+              <a:lnRef idx="2">
+                <a:schemeClr val="accent1">
+                  <a:shade val="50000"/>
+                </a:schemeClr>
+              </a:lnRef>
+              <a:fillRef idx="1">
+                <a:schemeClr val="accent1"/>
+              </a:fillRef>
+              <a:effectRef idx="0">
+                <a:schemeClr val="accent1"/>
+              </a:effectRef>
+              <a:fontRef idx="minor">
+                <a:schemeClr val="lt1"/>
+              </a:fontRef>
+            </p:style>
+            <p:txBody>
+              <a:bodyPr rtlCol="0" anchor="ctr"/>
+              <a:lstStyle/>
+              <a:p>
+                <a:pPr algn="ctr"/>
+                <a:r>
+                  <a:rPr lang="en-US" dirty="0">
+                    <a:solidFill>
+                      <a:schemeClr val="tx1"/>
+                    </a:solidFill>
+                  </a:rPr>
+                  <a:t>3</a:t>
+                </a:r>
+                <a:endParaRPr lang="it-IT" dirty="0">
+                  <a:solidFill>
+                    <a:schemeClr val="tx1"/>
+                  </a:solidFill>
+                </a:endParaRPr>
+              </a:p>
+            </p:txBody>
+          </p:sp>
+          <p:sp>
+            <p:nvSpPr>
+              <p:cNvPr id="8" name="Oval 7"/>
+              <p:cNvSpPr/>
+              <p:nvPr/>
+            </p:nvSpPr>
+            <p:spPr>
+              <a:xfrm>
+                <a:off x="4759358" y="1935316"/>
+                <a:ext cx="432620" cy="412955"/>
+              </a:xfrm>
+              <a:prstGeom prst="ellipse">
+                <a:avLst/>
+              </a:prstGeom>
+              <a:solidFill>
+                <a:schemeClr val="bg1"/>
+              </a:solidFill>
+            </p:spPr>
+            <p:style>
+              <a:lnRef idx="2">
+                <a:schemeClr val="accent1">
+                  <a:shade val="50000"/>
+                </a:schemeClr>
+              </a:lnRef>
+              <a:fillRef idx="1">
+                <a:schemeClr val="accent1"/>
+              </a:fillRef>
+              <a:effectRef idx="0">
+                <a:schemeClr val="accent1"/>
+              </a:effectRef>
+              <a:fontRef idx="minor">
+                <a:schemeClr val="lt1"/>
+              </a:fontRef>
+            </p:style>
+            <p:txBody>
+              <a:bodyPr rtlCol="0" anchor="ctr"/>
+              <a:lstStyle/>
+              <a:p>
+                <a:pPr algn="ctr"/>
+                <a:r>
+                  <a:rPr lang="en-US" dirty="0" smtClean="0">
+                    <a:solidFill>
+                      <a:schemeClr val="tx1"/>
+                    </a:solidFill>
+                  </a:rPr>
+                  <a:t>4</a:t>
+                </a:r>
+                <a:endParaRPr lang="it-IT" dirty="0">
+                  <a:solidFill>
+                    <a:schemeClr val="tx1"/>
+                  </a:solidFill>
+                </a:endParaRPr>
+              </a:p>
+            </p:txBody>
+          </p:sp>
+          <p:cxnSp>
+            <p:nvCxnSpPr>
+              <p:cNvPr id="10" name="Straight Connector 9"/>
+              <p:cNvCxnSpPr>
+                <a:stCxn id="5" idx="7"/>
+                <a:endCxn id="7" idx="2"/>
+              </p:cNvCxnSpPr>
+              <p:nvPr/>
+            </p:nvCxnSpPr>
+            <p:spPr>
+              <a:xfrm flipV="1">
+                <a:off x="1873599" y="2128685"/>
+                <a:ext cx="820440" cy="606166"/>
+              </a:xfrm>
+              <a:prstGeom prst="line">
+                <a:avLst/>
+              </a:prstGeom>
+            </p:spPr>
+            <p:style>
+              <a:lnRef idx="1">
+                <a:schemeClr val="accent1"/>
+              </a:lnRef>
+              <a:fillRef idx="0">
+                <a:schemeClr val="accent1"/>
+              </a:fillRef>
+              <a:effectRef idx="0">
+                <a:schemeClr val="accent1"/>
+              </a:effectRef>
+              <a:fontRef idx="minor">
+                <a:schemeClr val="tx1"/>
+              </a:fontRef>
+            </p:style>
+          </p:cxnSp>
+          <p:cxnSp>
+            <p:nvCxnSpPr>
+              <p:cNvPr id="12" name="Straight Connector 11"/>
+              <p:cNvCxnSpPr>
+                <a:stCxn id="7" idx="6"/>
+                <a:endCxn id="8" idx="2"/>
+              </p:cNvCxnSpPr>
+              <p:nvPr/>
+            </p:nvCxnSpPr>
+            <p:spPr>
+              <a:xfrm>
+                <a:off x="3126659" y="2128685"/>
+                <a:ext cx="1632699" cy="13109"/>
+              </a:xfrm>
+              <a:prstGeom prst="line">
+                <a:avLst/>
+              </a:prstGeom>
+            </p:spPr>
+            <p:style>
+              <a:lnRef idx="1">
+                <a:schemeClr val="accent1"/>
+              </a:lnRef>
+              <a:fillRef idx="0">
+                <a:schemeClr val="accent1"/>
+              </a:fillRef>
+              <a:effectRef idx="0">
+                <a:schemeClr val="accent1"/>
+              </a:effectRef>
+              <a:fontRef idx="minor">
+                <a:schemeClr val="tx1"/>
+              </a:fontRef>
+            </p:style>
+          </p:cxnSp>
+          <p:cxnSp>
+            <p:nvCxnSpPr>
+              <p:cNvPr id="14" name="Straight Connector 13"/>
+              <p:cNvCxnSpPr>
+                <a:stCxn id="8" idx="4"/>
+                <a:endCxn id="6" idx="0"/>
+              </p:cNvCxnSpPr>
+              <p:nvPr/>
+            </p:nvCxnSpPr>
+            <p:spPr>
+              <a:xfrm flipH="1">
+                <a:off x="4042450" y="2348271"/>
+                <a:ext cx="933218" cy="326104"/>
+              </a:xfrm>
+              <a:prstGeom prst="line">
+                <a:avLst/>
+              </a:prstGeom>
+            </p:spPr>
+            <p:style>
+              <a:lnRef idx="1">
+                <a:schemeClr val="accent1"/>
+              </a:lnRef>
+              <a:fillRef idx="0">
+                <a:schemeClr val="accent1"/>
+              </a:fillRef>
+              <a:effectRef idx="0">
+                <a:schemeClr val="accent1"/>
+              </a:effectRef>
+              <a:fontRef idx="minor">
+                <a:schemeClr val="tx1"/>
+              </a:fontRef>
+            </p:style>
+          </p:cxnSp>
+          <p:cxnSp>
+            <p:nvCxnSpPr>
+              <p:cNvPr id="16" name="Straight Connector 15"/>
+              <p:cNvCxnSpPr>
+                <a:stCxn id="7" idx="5"/>
+                <a:endCxn id="6" idx="0"/>
+              </p:cNvCxnSpPr>
+              <p:nvPr/>
+            </p:nvCxnSpPr>
+            <p:spPr>
+              <a:xfrm>
+                <a:off x="3063303" y="2274686"/>
+                <a:ext cx="979147" cy="399689"/>
+              </a:xfrm>
+              <a:prstGeom prst="line">
+                <a:avLst/>
+              </a:prstGeom>
+            </p:spPr>
+            <p:style>
+              <a:lnRef idx="1">
+                <a:schemeClr val="accent1"/>
+              </a:lnRef>
+              <a:fillRef idx="0">
+                <a:schemeClr val="accent1"/>
+              </a:fillRef>
+              <a:effectRef idx="0">
+                <a:schemeClr val="accent1"/>
+              </a:effectRef>
+              <a:fontRef idx="minor">
+                <a:schemeClr val="tx1"/>
+              </a:fontRef>
+            </p:style>
+          </p:cxnSp>
+          <p:cxnSp>
+            <p:nvCxnSpPr>
+              <p:cNvPr id="18" name="Straight Connector 17"/>
+              <p:cNvCxnSpPr>
+                <a:stCxn id="5" idx="6"/>
+                <a:endCxn id="6" idx="2"/>
+              </p:cNvCxnSpPr>
+              <p:nvPr/>
+            </p:nvCxnSpPr>
+            <p:spPr>
+              <a:xfrm>
+                <a:off x="1936955" y="2880853"/>
+                <a:ext cx="1889185" cy="0"/>
+              </a:xfrm>
+              <a:prstGeom prst="line">
+                <a:avLst/>
+              </a:prstGeom>
+            </p:spPr>
+            <p:style>
+              <a:lnRef idx="1">
+                <a:schemeClr val="accent1"/>
+              </a:lnRef>
+              <a:fillRef idx="0">
+                <a:schemeClr val="accent1"/>
+              </a:fillRef>
+              <a:effectRef idx="0">
+                <a:schemeClr val="accent1"/>
+              </a:effectRef>
+              <a:fontRef idx="minor">
+                <a:schemeClr val="tx1"/>
+              </a:fontRef>
+            </p:style>
+          </p:cxnSp>
+          <p:sp>
+            <p:nvSpPr>
+              <p:cNvPr id="19" name="TextBox 18"/>
+              <p:cNvSpPr txBox="1"/>
+              <p:nvPr/>
+            </p:nvSpPr>
+            <p:spPr>
+              <a:xfrm>
+                <a:off x="1873599" y="2141793"/>
+                <a:ext cx="410220" cy="369332"/>
+              </a:xfrm>
+              <a:prstGeom prst="rect">
+                <a:avLst/>
+              </a:prstGeom>
+              <a:noFill/>
+            </p:spPr>
+            <p:txBody>
+              <a:bodyPr wrap="square" rtlCol="0">
+                <a:spAutoFit/>
+              </a:bodyPr>
+              <a:lstStyle/>
+              <a:p>
+                <a:pPr algn="ctr"/>
+                <a:r>
+                  <a:rPr lang="en-US" dirty="0"/>
+                  <a:t>2</a:t>
+                </a:r>
+                <a:endParaRPr lang="it-IT" dirty="0"/>
+              </a:p>
+            </p:txBody>
+          </p:sp>
+          <p:sp>
+            <p:nvSpPr>
+              <p:cNvPr id="21" name="TextBox 20"/>
+              <p:cNvSpPr txBox="1"/>
+              <p:nvPr/>
+            </p:nvSpPr>
+            <p:spPr>
+              <a:xfrm>
+                <a:off x="3536879" y="2185574"/>
+                <a:ext cx="487369" cy="369332"/>
+              </a:xfrm>
+              <a:prstGeom prst="rect">
+                <a:avLst/>
+              </a:prstGeom>
+              <a:noFill/>
+            </p:spPr>
+            <p:txBody>
+              <a:bodyPr wrap="square" rtlCol="0">
+                <a:spAutoFit/>
+              </a:bodyPr>
+              <a:lstStyle/>
+              <a:p>
+                <a:pPr algn="ctr"/>
+                <a:r>
+                  <a:rPr lang="en-US" dirty="0"/>
+                  <a:t>5</a:t>
+                </a:r>
+                <a:endParaRPr lang="it-IT" dirty="0"/>
+              </a:p>
+            </p:txBody>
+          </p:sp>
+          <p:sp>
+            <p:nvSpPr>
+              <p:cNvPr id="23" name="TextBox 22"/>
+              <p:cNvSpPr txBox="1"/>
+              <p:nvPr/>
+            </p:nvSpPr>
+            <p:spPr>
+              <a:xfrm>
+                <a:off x="3618084" y="1765907"/>
+                <a:ext cx="487369" cy="369332"/>
+              </a:xfrm>
+              <a:prstGeom prst="rect">
+                <a:avLst/>
+              </a:prstGeom>
+              <a:noFill/>
+            </p:spPr>
+            <p:txBody>
+              <a:bodyPr wrap="square" rtlCol="0">
+                <a:spAutoFit/>
+              </a:bodyPr>
+              <a:lstStyle/>
+              <a:p>
+                <a:pPr algn="ctr"/>
+                <a:r>
+                  <a:rPr lang="en-US" dirty="0" smtClean="0"/>
+                  <a:t>1</a:t>
+                </a:r>
+                <a:endParaRPr lang="it-IT" dirty="0"/>
+              </a:p>
+            </p:txBody>
+          </p:sp>
+          <p:sp>
+            <p:nvSpPr>
+              <p:cNvPr id="24" name="TextBox 23"/>
+              <p:cNvSpPr txBox="1"/>
+              <p:nvPr/>
+            </p:nvSpPr>
+            <p:spPr>
+              <a:xfrm>
+                <a:off x="4317918" y="2461382"/>
+                <a:ext cx="487369" cy="369332"/>
+              </a:xfrm>
+              <a:prstGeom prst="rect">
+                <a:avLst/>
+              </a:prstGeom>
+              <a:noFill/>
+            </p:spPr>
+            <p:txBody>
+              <a:bodyPr wrap="square" rtlCol="0">
+                <a:spAutoFit/>
+              </a:bodyPr>
+              <a:lstStyle/>
+              <a:p>
+                <a:pPr algn="ctr"/>
+                <a:r>
+                  <a:rPr lang="en-US" dirty="0" smtClean="0"/>
+                  <a:t>1</a:t>
+                </a:r>
+                <a:endParaRPr lang="it-IT" dirty="0"/>
+              </a:p>
+            </p:txBody>
+          </p:sp>
+        </p:grpSp>
+      </p:grpSp>
+    </p:spTree>
+    <p:extLst>
+      <p:ext uri="{BB962C8B-B14F-4D97-AF65-F5344CB8AC3E}">
+        <p14:creationId xmlns:p14="http://schemas.microsoft.com/office/powerpoint/2010/main" val="1232374436"/>
+      </p:ext>
+    </p:extLst>
+  </p:cSld>
+  <p:clrMapOvr>
+    <a:masterClrMapping/>
+  </p:clrMapOvr>
+</p:sld>
+</file>
+
+<file path=ppt/slides/slide23.xml><?xml version="1.0" encoding="utf-8"?>
+<p:sld xmlns:a="http://schemas.openxmlformats.org/drawingml/2006/main" xmlns:r="http://schemas.openxmlformats.org/officeDocument/2006/relationships" xmlns:p="http://schemas.openxmlformats.org/presentationml/2006/main">
+  <p:cSld>
+    <p:spTree>
+      <p:nvGrpSpPr>
+        <p:cNvPr id="1" name=""/>
+        <p:cNvGrpSpPr/>
+        <p:nvPr/>
+      </p:nvGrpSpPr>
+      <p:grpSpPr>
+        <a:xfrm>
+          <a:off x="0" y="0"/>
+          <a:ext cx="0" cy="0"/>
+          <a:chOff x="0" y="0"/>
+          <a:chExt cx="0" cy="0"/>
+        </a:xfrm>
+      </p:grpSpPr>
+      <p:sp>
+        <p:nvSpPr>
+          <p:cNvPr id="2" name="Title 1"/>
+          <p:cNvSpPr>
+            <a:spLocks noGrp="1"/>
+          </p:cNvSpPr>
+          <p:nvPr>
+            <p:ph type="title"/>
+          </p:nvPr>
+        </p:nvSpPr>
+        <p:spPr/>
+        <p:txBody>
+          <a:bodyPr/>
+          <a:lstStyle/>
+          <a:p>
+            <a:r>
+              <a:rPr lang="en-US" dirty="0" smtClean="0"/>
+              <a:t>Floyd </a:t>
+            </a:r>
+            <a:r>
+              <a:rPr lang="en-US" dirty="0" err="1" smtClean="0"/>
+              <a:t>Warshall</a:t>
+            </a:r>
+            <a:r>
+              <a:rPr lang="en-US" dirty="0" smtClean="0"/>
+              <a:t> </a:t>
+            </a:r>
+            <a:r>
+              <a:rPr lang="en-US" dirty="0" err="1" smtClean="0"/>
+              <a:t>memoization</a:t>
+            </a:r>
+            <a:endParaRPr lang="it-IT" dirty="0"/>
+          </a:p>
+        </p:txBody>
+      </p:sp>
+      <p:sp>
+        <p:nvSpPr>
+          <p:cNvPr id="3" name="Content Placeholder 2"/>
+          <p:cNvSpPr>
+            <a:spLocks noGrp="1"/>
+          </p:cNvSpPr>
+          <p:nvPr>
+            <p:ph idx="1"/>
+          </p:nvPr>
+        </p:nvSpPr>
+        <p:spPr/>
+        <p:txBody>
+          <a:bodyPr/>
+          <a:lstStyle/>
+          <a:p>
+            <a:r>
+              <a:rPr lang="en-US" dirty="0" smtClean="0"/>
+              <a:t>We can save the intermediate results we compute into a matrix.</a:t>
+            </a:r>
+          </a:p>
+          <a:p>
+            <a:r>
+              <a:rPr lang="en-US" dirty="0" smtClean="0"/>
+              <a:t>This matrix contains the length of the path from vertex </a:t>
+            </a:r>
+            <a:r>
+              <a:rPr lang="en-US" dirty="0" err="1" smtClean="0"/>
+              <a:t>i</a:t>
+            </a:r>
+            <a:r>
+              <a:rPr lang="en-US" dirty="0" smtClean="0"/>
+              <a:t> to vertex j.</a:t>
+            </a:r>
+          </a:p>
+          <a:p>
+            <a:r>
+              <a:rPr lang="en-US" dirty="0" smtClean="0"/>
+              <a:t>The algorithm uses an iterative bottom up approach. </a:t>
+            </a:r>
+          </a:p>
+          <a:p>
+            <a:r>
+              <a:rPr lang="en-US" dirty="0" smtClean="0"/>
+              <a:t>We start by filling the matrix with the base case solutions, i.e. with 0 the distance between a vertex and itself, and with w(</a:t>
+            </a:r>
+            <a:r>
+              <a:rPr lang="en-US" dirty="0" err="1"/>
+              <a:t>i</a:t>
+            </a:r>
+            <a:r>
+              <a:rPr lang="en-US" dirty="0" err="1" smtClean="0"/>
+              <a:t>,j</a:t>
+            </a:r>
+            <a:r>
+              <a:rPr lang="en-US" dirty="0" smtClean="0"/>
+              <a:t>) the distance between adjacent vertices.</a:t>
+            </a:r>
+          </a:p>
+          <a:p>
+            <a:r>
+              <a:rPr lang="en-US" dirty="0" smtClean="0"/>
+              <a:t>We fill in the matrix by iteratively expanding the set of intermediate vertices to use in the path.</a:t>
+            </a:r>
+            <a:endParaRPr lang="it-IT" dirty="0"/>
+          </a:p>
+        </p:txBody>
+      </p:sp>
+      <p:sp>
+        <p:nvSpPr>
+          <p:cNvPr id="4" name="Footer Placeholder 3"/>
+          <p:cNvSpPr>
+            <a:spLocks noGrp="1"/>
+          </p:cNvSpPr>
+          <p:nvPr>
+            <p:ph type="ftr" sz="quarter" idx="11"/>
+          </p:nvPr>
+        </p:nvSpPr>
+        <p:spPr/>
+        <p:txBody>
+          <a:bodyPr/>
+          <a:lstStyle/>
+          <a:p>
+            <a:r>
+              <a:rPr lang="it-IT" smtClean="0"/>
+              <a:t>INFDEV026A - G. Costantini, F. Di Giacomo, G. Maggiore</a:t>
+            </a:r>
+            <a:endParaRPr lang="en-GB"/>
+          </a:p>
+        </p:txBody>
+      </p:sp>
+    </p:spTree>
+    <p:extLst>
+      <p:ext uri="{BB962C8B-B14F-4D97-AF65-F5344CB8AC3E}">
+        <p14:creationId xmlns:p14="http://schemas.microsoft.com/office/powerpoint/2010/main" val="360321049"/>
+      </p:ext>
+    </p:extLst>
+  </p:cSld>
+  <p:clrMapOvr>
+    <a:masterClrMapping/>
+  </p:clrMapOvr>
+</p:sld>
+</file>
+
+<file path=ppt/slides/slide24.xml><?xml version="1.0" encoding="utf-8"?>
+<p:sld xmlns:a="http://schemas.openxmlformats.org/drawingml/2006/main" xmlns:r="http://schemas.openxmlformats.org/officeDocument/2006/relationships" xmlns:p="http://schemas.openxmlformats.org/presentationml/2006/main">
+  <p:cSld>
+    <p:spTree>
+      <p:nvGrpSpPr>
+        <p:cNvPr id="1" name=""/>
+        <p:cNvGrpSpPr/>
+        <p:nvPr/>
+      </p:nvGrpSpPr>
+      <p:grpSpPr>
+        <a:xfrm>
+          <a:off x="0" y="0"/>
+          <a:ext cx="0" cy="0"/>
+          <a:chOff x="0" y="0"/>
+          <a:chExt cx="0" cy="0"/>
+        </a:xfrm>
+      </p:grpSpPr>
+      <p:sp>
+        <p:nvSpPr>
           <p:cNvPr id="2" name="Titel 1"/>
           <p:cNvSpPr>
             <a:spLocks noGrp="1"/>
@@ -12980,8 +13870,8 @@
           </a:p>
         </p:txBody>
       </p:sp>
-      <mc:AlternateContent xmlns:mc="http://schemas.openxmlformats.org/markup-compatibility/2006">
-        <mc:Choice xmlns:a14="http://schemas.microsoft.com/office/drawing/2010/main" Requires="a14">
+      <mc:AlternateContent xmlns:mc="http://schemas.openxmlformats.org/markup-compatibility/2006" xmlns:a14="http://schemas.microsoft.com/office/drawing/2010/main">
+        <mc:Choice Requires="a14">
           <p:sp>
             <p:nvSpPr>
               <p:cNvPr id="3" name="Tijdelijke aanduiding voor inhoud 2"/>
@@ -13445,11 +14335,7 @@
                 </a14:m>
                 <a:r>
                   <a:rPr lang="en-US" dirty="0"/>
-                  <a:t> pairs</a:t>
-                </a:r>
-                <a:r>
-                  <a:rPr lang="en-US" dirty="0"/>
-                  <a:t> when</a:t>
+                  <a:t> pairs when</a:t>
                 </a:r>
                 <a14:m>
                   <m:oMath xmlns:m="http://schemas.openxmlformats.org/officeDocument/2006/math">
@@ -13636,11 +14522,7 @@
                 </a14:m>
                 <a:r>
                   <a:rPr lang="en-US" dirty="0"/>
-                  <a:t> pairs</a:t>
-                </a:r>
-                <a:r>
-                  <a:rPr lang="en-US" dirty="0"/>
-                  <a:t> when</a:t>
+                  <a:t> pairs when</a:t>
                 </a:r>
                 <a14:m>
                   <m:oMath xmlns:m="http://schemas.openxmlformats.org/officeDocument/2006/math">
@@ -13817,7 +14699,7 @@
             </p:txBody>
           </p:sp>
         </mc:Choice>
-        <mc:Fallback>
+        <mc:Fallback xmlns="">
           <p:sp>
             <p:nvSpPr>
               <p:cNvPr id="3" name="Tijdelijke aanduiding voor inhoud 2"/>
@@ -13891,7 +14773,7 @@
 </p:sld>
 </file>
 
-<file path=ppt/slides/slide23.xml><?xml version="1.0" encoding="utf-8"?>
+<file path=ppt/slides/slide25.xml><?xml version="1.0" encoding="utf-8"?>
 <p:sld xmlns:a="http://schemas.openxmlformats.org/drawingml/2006/main" xmlns:r="http://schemas.openxmlformats.org/officeDocument/2006/relationships" xmlns:p="http://schemas.openxmlformats.org/presentationml/2006/main">
   <p:cSld>
     <p:spTree>
@@ -13943,8 +14825,8 @@
           </a:p>
         </p:txBody>
       </p:sp>
-      <mc:AlternateContent xmlns:mc="http://schemas.openxmlformats.org/markup-compatibility/2006">
-        <mc:Choice xmlns:a14="http://schemas.microsoft.com/office/drawing/2010/main" Requires="a14">
+      <mc:AlternateContent xmlns:mc="http://schemas.openxmlformats.org/markup-compatibility/2006" xmlns:a14="http://schemas.microsoft.com/office/drawing/2010/main">
+        <mc:Choice Requires="a14">
           <p:sp>
             <p:nvSpPr>
               <p:cNvPr id="3" name="Tijdelijke aanduiding voor inhoud 2"/>
@@ -14481,7 +15363,7 @@
             </p:txBody>
           </p:sp>
         </mc:Choice>
-        <mc:Fallback>
+        <mc:Fallback xmlns="">
           <p:sp>
             <p:nvSpPr>
               <p:cNvPr id="3" name="Tijdelijke aanduiding voor inhoud 2"/>
@@ -14555,7 +15437,7 @@
 </p:sld>
 </file>
 
-<file path=ppt/slides/slide24.xml><?xml version="1.0" encoding="utf-8"?>
+<file path=ppt/slides/slide26.xml><?xml version="1.0" encoding="utf-8"?>
 <p:sld xmlns:a="http://schemas.openxmlformats.org/drawingml/2006/main" xmlns:r="http://schemas.openxmlformats.org/officeDocument/2006/relationships" xmlns:p="http://schemas.openxmlformats.org/presentationml/2006/main">
   <p:cSld>
     <p:spTree>
@@ -14786,8 +15668,8 @@
           </a:p>
         </p:txBody>
       </p:sp>
-      <mc:AlternateContent xmlns:mc="http://schemas.openxmlformats.org/markup-compatibility/2006">
-        <mc:Choice xmlns:a14="http://schemas.microsoft.com/office/drawing/2010/main" Requires="a14">
+      <mc:AlternateContent xmlns:mc="http://schemas.openxmlformats.org/markup-compatibility/2006" xmlns:a14="http://schemas.microsoft.com/office/drawing/2010/main">
+        <mc:Choice Requires="a14">
           <p:sp>
             <p:nvSpPr>
               <p:cNvPr id="5" name="Tekstvak 4"/>
@@ -14815,42 +15697,7 @@
                     <a:latin typeface="Consolas" panose="020B0609020204030204" pitchFamily="49" charset="0"/>
                     <a:cs typeface="Consolas" panose="020B0609020204030204" pitchFamily="49" charset="0"/>
                   </a:rPr>
-                  <a:t>dist </a:t>
-                </a:r>
-                <a:r>
-                  <a:rPr lang="nl-NL" sz="1600" dirty="0">
-                    <a:latin typeface="Consolas" panose="020B0609020204030204" pitchFamily="49" charset="0"/>
-                    <a:cs typeface="Consolas" panose="020B0609020204030204" pitchFamily="49" charset="0"/>
-                  </a:rPr>
-                  <a:t>←</a:t>
-                </a:r>
-                <a:r>
-                  <a:rPr lang="nl-NL" sz="1600" dirty="0">
-                    <a:latin typeface="Consolas" panose="020B0609020204030204" pitchFamily="49" charset="0"/>
-                    <a:cs typeface="Consolas" panose="020B0609020204030204" pitchFamily="49" charset="0"/>
-                  </a:rPr>
-                  <a:t> </a:t>
-                </a:r>
-                <a:r>
-                  <a:rPr lang="nl-NL" sz="1600" dirty="0">
-                    <a:latin typeface="Consolas" panose="020B0609020204030204" pitchFamily="49" charset="0"/>
-                    <a:cs typeface="Consolas" panose="020B0609020204030204" pitchFamily="49" charset="0"/>
-                  </a:rPr>
-                  <a:t>|V| × |V| </a:t>
-                </a:r>
-                <a:r>
-                  <a:rPr lang="nl-NL" sz="1600" dirty="0">
-                    <a:latin typeface="Consolas" panose="020B0609020204030204" pitchFamily="49" charset="0"/>
-                    <a:cs typeface="Consolas" panose="020B0609020204030204" pitchFamily="49" charset="0"/>
-                  </a:rPr>
-                  <a:t>matrix of </a:t>
-                </a:r>
-                <a:r>
-                  <a:rPr lang="nl-NL" sz="1600" dirty="0">
-                    <a:latin typeface="Consolas" panose="020B0609020204030204" pitchFamily="49" charset="0"/>
-                    <a:cs typeface="Consolas" panose="020B0609020204030204" pitchFamily="49" charset="0"/>
-                  </a:rPr>
-                  <a:t>minimum </a:t>
+                  <a:t>dist ← |V| × |V| matrix of minimum </a:t>
                 </a:r>
                 <a:r>
                   <a:rPr lang="nl-NL" sz="1600" dirty="0" err="1">
@@ -14918,57 +15765,7 @@
                     <a:latin typeface="Consolas" panose="020B0609020204030204" pitchFamily="49" charset="0"/>
                     <a:cs typeface="Consolas" panose="020B0609020204030204" pitchFamily="49" charset="0"/>
                   </a:rPr>
-                  <a:t>next </a:t>
-                </a:r>
-                <a:r>
-                  <a:rPr lang="nl-NL" sz="1600" dirty="0">
-                    <a:solidFill>
-                      <a:srgbClr val="FF0000"/>
-                    </a:solidFill>
-                    <a:latin typeface="Consolas" panose="020B0609020204030204" pitchFamily="49" charset="0"/>
-                    <a:cs typeface="Consolas" panose="020B0609020204030204" pitchFamily="49" charset="0"/>
-                  </a:rPr>
-                  <a:t>←</a:t>
-                </a:r>
-                <a:r>
-                  <a:rPr lang="nl-NL" sz="1600" dirty="0">
-                    <a:solidFill>
-                      <a:srgbClr val="FF0000"/>
-                    </a:solidFill>
-                    <a:latin typeface="Consolas" panose="020B0609020204030204" pitchFamily="49" charset="0"/>
-                    <a:cs typeface="Consolas" panose="020B0609020204030204" pitchFamily="49" charset="0"/>
-                  </a:rPr>
-                  <a:t> </a:t>
-                </a:r>
-                <a:r>
-                  <a:rPr lang="nl-NL" sz="1600" dirty="0">
-                    <a:solidFill>
-                      <a:srgbClr val="FF0000"/>
-                    </a:solidFill>
-                    <a:latin typeface="Consolas" panose="020B0609020204030204" pitchFamily="49" charset="0"/>
-                    <a:cs typeface="Consolas" panose="020B0609020204030204" pitchFamily="49" charset="0"/>
-                  </a:rPr>
-                  <a:t>|V| × |V| </a:t>
-                </a:r>
-                <a:r>
-                  <a:rPr lang="nl-NL" sz="1600" dirty="0">
-                    <a:solidFill>
-                      <a:srgbClr val="FF0000"/>
-                    </a:solidFill>
-                    <a:latin typeface="Consolas" panose="020B0609020204030204" pitchFamily="49" charset="0"/>
-                    <a:cs typeface="Consolas" panose="020B0609020204030204" pitchFamily="49" charset="0"/>
-                  </a:rPr>
-                  <a:t>matrix of </a:t>
-                </a:r>
-                <a:r>
-                  <a:rPr lang="nl-NL" sz="1600" dirty="0">
-                    <a:solidFill>
-                      <a:srgbClr val="FF0000"/>
-                    </a:solidFill>
-                    <a:latin typeface="Consolas" panose="020B0609020204030204" pitchFamily="49" charset="0"/>
-                    <a:cs typeface="Consolas" panose="020B0609020204030204" pitchFamily="49" charset="0"/>
-                  </a:rPr>
-                  <a:t>vertex indices </a:t>
+                  <a:t>next ← |V| × |V| matrix of vertex indices </a:t>
                 </a:r>
                 <a:r>
                   <a:rPr lang="nl-NL" sz="1600" dirty="0" err="1">
@@ -15108,10 +15905,6 @@
                   </a:rPr>
                   <a:t>)</a:t>
                 </a:r>
-                <a:endParaRPr lang="nl-NL" sz="1600" dirty="0">
-                  <a:latin typeface="Consolas" panose="020B0609020204030204" pitchFamily="49" charset="0"/>
-                  <a:cs typeface="Consolas" panose="020B0609020204030204" pitchFamily="49" charset="0"/>
-                </a:endParaRPr>
               </a:p>
               <a:p>
                 <a:r>
@@ -15180,19 +15973,8 @@
                     <a:latin typeface="Consolas" panose="020B0609020204030204" pitchFamily="49" charset="0"/>
                     <a:cs typeface="Consolas" panose="020B0609020204030204" pitchFamily="49" charset="0"/>
                   </a:rPr>
-                  <a:t> |V</a:t>
-                </a:r>
-                <a:r>
-                  <a:rPr lang="nl-NL" sz="1600" dirty="0">
-                    <a:latin typeface="Consolas" panose="020B0609020204030204" pitchFamily="49" charset="0"/>
-                    <a:cs typeface="Consolas" panose="020B0609020204030204" pitchFamily="49" charset="0"/>
-                  </a:rPr>
-                  <a:t>|</a:t>
-                </a:r>
-                <a:endParaRPr lang="nl-NL" sz="1600" dirty="0">
-                  <a:latin typeface="Consolas" panose="020B0609020204030204" pitchFamily="49" charset="0"/>
-                  <a:cs typeface="Consolas" panose="020B0609020204030204" pitchFamily="49" charset="0"/>
-                </a:endParaRPr>
+                  <a:t> |V|</a:t>
+                </a:r>
               </a:p>
               <a:p>
                 <a:r>
@@ -15364,7 +16146,7 @@
             </p:txBody>
           </p:sp>
         </mc:Choice>
-        <mc:Fallback>
+        <mc:Fallback xmlns="">
           <p:sp>
             <p:nvSpPr>
               <p:cNvPr id="5" name="Tekstvak 4"/>
@@ -15416,7 +16198,7 @@
 </p:sld>
 </file>
 
-<file path=ppt/slides/slide25.xml><?xml version="1.0" encoding="utf-8"?>
+<file path=ppt/slides/slide27.xml><?xml version="1.0" encoding="utf-8"?>
 <p:sld xmlns:a="http://schemas.openxmlformats.org/drawingml/2006/main" xmlns:r="http://schemas.openxmlformats.org/officeDocument/2006/relationships" xmlns:p="http://schemas.openxmlformats.org/presentationml/2006/main">
   <p:cSld>
     <p:spTree>
@@ -15468,8 +16250,8 @@
           </a:p>
         </p:txBody>
       </p:sp>
-      <mc:AlternateContent xmlns:mc="http://schemas.openxmlformats.org/markup-compatibility/2006">
-        <mc:Choice xmlns:a14="http://schemas.microsoft.com/office/drawing/2010/main" Requires="a14">
+      <mc:AlternateContent xmlns:mc="http://schemas.openxmlformats.org/markup-compatibility/2006" xmlns:a14="http://schemas.microsoft.com/office/drawing/2010/main">
+        <mc:Choice Requires="a14">
           <p:sp>
             <p:nvSpPr>
               <p:cNvPr id="3" name="Tijdelijke aanduiding voor inhoud 2"/>
@@ -15845,7 +16627,7 @@
             </p:txBody>
           </p:sp>
         </mc:Choice>
-        <mc:Fallback>
+        <mc:Fallback xmlns="">
           <p:sp>
             <p:nvSpPr>
               <p:cNvPr id="3" name="Tijdelijke aanduiding voor inhoud 2"/>
@@ -15915,7 +16697,7 @@
 </p:sld>
 </file>
 
-<file path=ppt/slides/slide26.xml><?xml version="1.0" encoding="utf-8"?>
+<file path=ppt/slides/slide28.xml><?xml version="1.0" encoding="utf-8"?>
 <p:sld xmlns:a="http://schemas.openxmlformats.org/drawingml/2006/main" xmlns:r="http://schemas.openxmlformats.org/officeDocument/2006/relationships" xmlns:p="http://schemas.openxmlformats.org/presentationml/2006/main">
   <p:cSld>
     <p:spTree>
@@ -16069,7 +16851,7 @@
 </p:sld>
 </file>
 
-<file path=ppt/slides/slide27.xml><?xml version="1.0" encoding="utf-8"?>
+<file path=ppt/slides/slide29.xml><?xml version="1.0" encoding="utf-8"?>
 <p:sld xmlns:a="http://schemas.openxmlformats.org/drawingml/2006/main" xmlns:r="http://schemas.openxmlformats.org/officeDocument/2006/relationships" xmlns:p="http://schemas.openxmlformats.org/presentationml/2006/main">
   <p:cSld>
     <p:spTree>
@@ -16266,7 +17048,258 @@
 </p:sld>
 </file>
 
-<file path=ppt/slides/slide28.xml><?xml version="1.0" encoding="utf-8"?>
+<file path=ppt/slides/slide3.xml><?xml version="1.0" encoding="utf-8"?>
+<p:sld xmlns:a="http://schemas.openxmlformats.org/drawingml/2006/main" xmlns:r="http://schemas.openxmlformats.org/officeDocument/2006/relationships" xmlns:p="http://schemas.openxmlformats.org/presentationml/2006/main">
+  <p:cSld>
+    <p:spTree>
+      <p:nvGrpSpPr>
+        <p:cNvPr id="1" name=""/>
+        <p:cNvGrpSpPr/>
+        <p:nvPr/>
+      </p:nvGrpSpPr>
+      <p:grpSpPr>
+        <a:xfrm>
+          <a:off x="0" y="0"/>
+          <a:ext cx="0" cy="0"/>
+          <a:chOff x="0" y="0"/>
+          <a:chExt cx="0" cy="0"/>
+        </a:xfrm>
+      </p:grpSpPr>
+      <p:sp>
+        <p:nvSpPr>
+          <p:cNvPr id="2" name="Titel 1"/>
+          <p:cNvSpPr>
+            <a:spLocks noGrp="1"/>
+          </p:cNvSpPr>
+          <p:nvPr>
+            <p:ph type="title"/>
+          </p:nvPr>
+        </p:nvSpPr>
+        <p:spPr/>
+        <p:txBody>
+          <a:bodyPr/>
+          <a:lstStyle/>
+          <a:p>
+            <a:r>
+              <a:rPr lang="nl-NL" dirty="0" smtClean="0"/>
+              <a:t>More </a:t>
+            </a:r>
+            <a:r>
+              <a:rPr lang="nl-NL" dirty="0" err="1" smtClean="0"/>
+              <a:t>detailed</a:t>
+            </a:r>
+            <a:r>
+              <a:rPr lang="nl-NL" dirty="0" smtClean="0"/>
+              <a:t> agenda</a:t>
+            </a:r>
+            <a:endParaRPr lang="nl-NL" dirty="0"/>
+          </a:p>
+        </p:txBody>
+      </p:sp>
+      <p:sp>
+        <p:nvSpPr>
+          <p:cNvPr id="3" name="Tijdelijke aanduiding voor inhoud 2"/>
+          <p:cNvSpPr>
+            <a:spLocks noGrp="1"/>
+          </p:cNvSpPr>
+          <p:nvPr>
+            <p:ph idx="1"/>
+          </p:nvPr>
+        </p:nvSpPr>
+        <p:spPr/>
+        <p:txBody>
+          <a:bodyPr/>
+          <a:lstStyle/>
+          <a:p>
+            <a:r>
+              <a:rPr lang="nl-NL" dirty="0" err="1" smtClean="0"/>
+              <a:t>What</a:t>
+            </a:r>
+            <a:r>
+              <a:rPr lang="nl-NL" dirty="0" smtClean="0"/>
+              <a:t> is </a:t>
+            </a:r>
+            <a:r>
+              <a:rPr lang="nl-NL" b="1" dirty="0" err="1" smtClean="0"/>
+              <a:t>dynamic</a:t>
+            </a:r>
+            <a:r>
+              <a:rPr lang="nl-NL" b="1" dirty="0" smtClean="0"/>
+              <a:t> </a:t>
+            </a:r>
+            <a:r>
+              <a:rPr lang="nl-NL" b="1" dirty="0" err="1" smtClean="0"/>
+              <a:t>programming</a:t>
+            </a:r>
+            <a:r>
+              <a:rPr lang="nl-NL" dirty="0" smtClean="0"/>
+              <a:t>?</a:t>
+            </a:r>
+          </a:p>
+          <a:p>
+            <a:pPr lvl="1"/>
+            <a:r>
+              <a:rPr lang="nl-NL" dirty="0" smtClean="0"/>
+              <a:t>Fibonacci </a:t>
+            </a:r>
+            <a:r>
+              <a:rPr lang="nl-NL" dirty="0" err="1" smtClean="0"/>
+              <a:t>example</a:t>
+            </a:r>
+            <a:r>
+              <a:rPr lang="nl-NL" dirty="0" smtClean="0"/>
+              <a:t>; </a:t>
+            </a:r>
+            <a:r>
+              <a:rPr lang="nl-NL" dirty="0" err="1" smtClean="0"/>
+              <a:t>memoization</a:t>
+            </a:r>
+            <a:r>
+              <a:rPr lang="nl-NL" dirty="0" smtClean="0"/>
+              <a:t> </a:t>
+            </a:r>
+            <a:r>
+              <a:rPr lang="nl-NL" dirty="0" err="1" smtClean="0"/>
+              <a:t>and</a:t>
+            </a:r>
+            <a:r>
+              <a:rPr lang="nl-NL" dirty="0" smtClean="0"/>
+              <a:t> bottom-up approaches</a:t>
+            </a:r>
+          </a:p>
+          <a:p>
+            <a:r>
+              <a:rPr lang="nl-NL" dirty="0" smtClean="0"/>
+              <a:t>How </a:t>
+            </a:r>
+            <a:r>
+              <a:rPr lang="nl-NL" dirty="0" err="1" smtClean="0"/>
+              <a:t>can</a:t>
+            </a:r>
+            <a:r>
+              <a:rPr lang="nl-NL" dirty="0" smtClean="0"/>
+              <a:t> we </a:t>
+            </a:r>
+            <a:r>
+              <a:rPr lang="nl-NL" dirty="0" err="1" smtClean="0"/>
+              <a:t>find</a:t>
+            </a:r>
+            <a:r>
+              <a:rPr lang="nl-NL" dirty="0" smtClean="0"/>
+              <a:t> the </a:t>
+            </a:r>
+            <a:r>
+              <a:rPr lang="nl-NL" dirty="0" err="1" smtClean="0"/>
+              <a:t>shortest</a:t>
+            </a:r>
+            <a:r>
+              <a:rPr lang="nl-NL" dirty="0" smtClean="0"/>
+              <a:t> </a:t>
+            </a:r>
+            <a:r>
+              <a:rPr lang="nl-NL" dirty="0" err="1" smtClean="0"/>
+              <a:t>paths</a:t>
+            </a:r>
+            <a:r>
+              <a:rPr lang="nl-NL" dirty="0" smtClean="0"/>
+              <a:t> </a:t>
+            </a:r>
+            <a:r>
+              <a:rPr lang="nl-NL" dirty="0" err="1" smtClean="0"/>
+              <a:t>between</a:t>
+            </a:r>
+            <a:r>
+              <a:rPr lang="nl-NL" dirty="0" smtClean="0"/>
+              <a:t> </a:t>
+            </a:r>
+            <a:r>
+              <a:rPr lang="nl-NL" b="1" dirty="0" err="1" smtClean="0"/>
+              <a:t>all</a:t>
+            </a:r>
+            <a:r>
+              <a:rPr lang="nl-NL" b="1" dirty="0" smtClean="0"/>
+              <a:t> pairs </a:t>
+            </a:r>
+            <a:r>
+              <a:rPr lang="nl-NL" dirty="0" smtClean="0"/>
+              <a:t>of </a:t>
+            </a:r>
+            <a:r>
+              <a:rPr lang="nl-NL" dirty="0" err="1" smtClean="0"/>
+              <a:t>nodes</a:t>
+            </a:r>
+            <a:r>
+              <a:rPr lang="nl-NL" dirty="0" smtClean="0"/>
+              <a:t> in a </a:t>
+            </a:r>
+            <a:r>
+              <a:rPr lang="nl-NL" dirty="0" err="1" smtClean="0"/>
+              <a:t>graph</a:t>
+            </a:r>
+            <a:r>
+              <a:rPr lang="nl-NL" dirty="0" smtClean="0"/>
+              <a:t>?</a:t>
+            </a:r>
+          </a:p>
+          <a:p>
+            <a:pPr lvl="1"/>
+            <a:r>
+              <a:rPr lang="nl-NL" dirty="0" smtClean="0"/>
+              <a:t>Floyd </a:t>
+            </a:r>
+            <a:r>
+              <a:rPr lang="nl-NL" dirty="0" err="1" smtClean="0"/>
+              <a:t>Warshall</a:t>
+            </a:r>
+            <a:r>
+              <a:rPr lang="nl-NL" dirty="0" smtClean="0"/>
+              <a:t> </a:t>
+            </a:r>
+            <a:r>
+              <a:rPr lang="nl-NL" dirty="0" err="1" smtClean="0"/>
+              <a:t>algorithm</a:t>
+            </a:r>
+            <a:endParaRPr lang="nl-NL" dirty="0"/>
+          </a:p>
+        </p:txBody>
+      </p:sp>
+      <p:sp>
+        <p:nvSpPr>
+          <p:cNvPr id="4" name="Tijdelijke aanduiding voor voettekst 3"/>
+          <p:cNvSpPr>
+            <a:spLocks noGrp="1"/>
+          </p:cNvSpPr>
+          <p:nvPr>
+            <p:ph type="ftr" sz="quarter" idx="11"/>
+          </p:nvPr>
+        </p:nvSpPr>
+        <p:spPr/>
+        <p:txBody>
+          <a:bodyPr/>
+          <a:lstStyle/>
+          <a:p>
+            <a:r>
+              <a:rPr lang="it-IT" smtClean="0"/>
+              <a:t>INFDEV026A - G. Costantini, F. Di Giacomo, G. Maggiore</a:t>
+            </a:r>
+            <a:endParaRPr lang="en-GB"/>
+          </a:p>
+        </p:txBody>
+      </p:sp>
+    </p:spTree>
+    <p:extLst>
+      <p:ext uri="{BB962C8B-B14F-4D97-AF65-F5344CB8AC3E}">
+        <p14:creationId xmlns:p14="http://schemas.microsoft.com/office/powerpoint/2010/main" val="3714923865"/>
+      </p:ext>
+    </p:extLst>
+  </p:cSld>
+  <p:clrMapOvr>
+    <a:masterClrMapping/>
+  </p:clrMapOvr>
+</p:sld>
+</file>
+
+<file path=ppt/slides/slide30.xml><?xml version="1.0" encoding="utf-8"?>
 <p:sld xmlns:a="http://schemas.openxmlformats.org/drawingml/2006/main" xmlns:r="http://schemas.openxmlformats.org/officeDocument/2006/relationships" xmlns:p="http://schemas.openxmlformats.org/presentationml/2006/main">
   <p:cSld>
     <p:spTree>
@@ -16506,7 +17539,7 @@
 </p:sld>
 </file>
 
-<file path=ppt/slides/slide29.xml><?xml version="1.0" encoding="utf-8"?>
+<file path=ppt/slides/slide31.xml><?xml version="1.0" encoding="utf-8"?>
 <p:sld xmlns:a="http://schemas.openxmlformats.org/drawingml/2006/main" xmlns:r="http://schemas.openxmlformats.org/officeDocument/2006/relationships" xmlns:p="http://schemas.openxmlformats.org/presentationml/2006/main">
   <p:cSld>
     <p:spTree>
@@ -16700,268 +17733,10 @@
   <p:clrMapOvr>
     <a:masterClrMapping/>
   </p:clrMapOvr>
-  <p:timing>
-    <p:tnLst>
-      <p:par>
-        <p:cTn id="1" dur="indefinite" restart="never" nodeType="tmRoot"/>
-      </p:par>
-    </p:tnLst>
-  </p:timing>
 </p:sld>
 </file>
 
-<file path=ppt/slides/slide3.xml><?xml version="1.0" encoding="utf-8"?>
-<p:sld xmlns:a="http://schemas.openxmlformats.org/drawingml/2006/main" xmlns:r="http://schemas.openxmlformats.org/officeDocument/2006/relationships" xmlns:p="http://schemas.openxmlformats.org/presentationml/2006/main">
-  <p:cSld>
-    <p:spTree>
-      <p:nvGrpSpPr>
-        <p:cNvPr id="1" name=""/>
-        <p:cNvGrpSpPr/>
-        <p:nvPr/>
-      </p:nvGrpSpPr>
-      <p:grpSpPr>
-        <a:xfrm>
-          <a:off x="0" y="0"/>
-          <a:ext cx="0" cy="0"/>
-          <a:chOff x="0" y="0"/>
-          <a:chExt cx="0" cy="0"/>
-        </a:xfrm>
-      </p:grpSpPr>
-      <p:sp>
-        <p:nvSpPr>
-          <p:cNvPr id="2" name="Titel 1"/>
-          <p:cNvSpPr>
-            <a:spLocks noGrp="1"/>
-          </p:cNvSpPr>
-          <p:nvPr>
-            <p:ph type="title"/>
-          </p:nvPr>
-        </p:nvSpPr>
-        <p:spPr/>
-        <p:txBody>
-          <a:bodyPr/>
-          <a:lstStyle/>
-          <a:p>
-            <a:r>
-              <a:rPr lang="nl-NL" dirty="0" smtClean="0"/>
-              <a:t>More </a:t>
-            </a:r>
-            <a:r>
-              <a:rPr lang="nl-NL" dirty="0" err="1" smtClean="0"/>
-              <a:t>detailed</a:t>
-            </a:r>
-            <a:r>
-              <a:rPr lang="nl-NL" dirty="0" smtClean="0"/>
-              <a:t> agenda</a:t>
-            </a:r>
-            <a:endParaRPr lang="nl-NL" dirty="0"/>
-          </a:p>
-        </p:txBody>
-      </p:sp>
-      <p:sp>
-        <p:nvSpPr>
-          <p:cNvPr id="3" name="Tijdelijke aanduiding voor inhoud 2"/>
-          <p:cNvSpPr>
-            <a:spLocks noGrp="1"/>
-          </p:cNvSpPr>
-          <p:nvPr>
-            <p:ph idx="1"/>
-          </p:nvPr>
-        </p:nvSpPr>
-        <p:spPr/>
-        <p:txBody>
-          <a:bodyPr/>
-          <a:lstStyle/>
-          <a:p>
-            <a:r>
-              <a:rPr lang="nl-NL" dirty="0" err="1" smtClean="0"/>
-              <a:t>What</a:t>
-            </a:r>
-            <a:r>
-              <a:rPr lang="nl-NL" dirty="0" smtClean="0"/>
-              <a:t> is </a:t>
-            </a:r>
-            <a:r>
-              <a:rPr lang="nl-NL" b="1" dirty="0" err="1" smtClean="0"/>
-              <a:t>dynamic</a:t>
-            </a:r>
-            <a:r>
-              <a:rPr lang="nl-NL" b="1" dirty="0" smtClean="0"/>
-              <a:t> </a:t>
-            </a:r>
-            <a:r>
-              <a:rPr lang="nl-NL" b="1" dirty="0" err="1" smtClean="0"/>
-              <a:t>programming</a:t>
-            </a:r>
-            <a:r>
-              <a:rPr lang="nl-NL" dirty="0" smtClean="0"/>
-              <a:t>?</a:t>
-            </a:r>
-          </a:p>
-          <a:p>
-            <a:pPr lvl="1"/>
-            <a:r>
-              <a:rPr lang="nl-NL" dirty="0" smtClean="0"/>
-              <a:t>Fibonacci </a:t>
-            </a:r>
-            <a:r>
-              <a:rPr lang="nl-NL" dirty="0" err="1" smtClean="0"/>
-              <a:t>example</a:t>
-            </a:r>
-            <a:r>
-              <a:rPr lang="nl-NL" dirty="0" smtClean="0"/>
-              <a:t>; </a:t>
-            </a:r>
-            <a:r>
-              <a:rPr lang="nl-NL" dirty="0" err="1" smtClean="0"/>
-              <a:t>memoization</a:t>
-            </a:r>
-            <a:r>
-              <a:rPr lang="nl-NL" dirty="0" smtClean="0"/>
-              <a:t> </a:t>
-            </a:r>
-            <a:r>
-              <a:rPr lang="nl-NL" dirty="0" err="1" smtClean="0"/>
-              <a:t>and</a:t>
-            </a:r>
-            <a:r>
-              <a:rPr lang="nl-NL" dirty="0" smtClean="0"/>
-              <a:t> bottom-up approaches</a:t>
-            </a:r>
-          </a:p>
-          <a:p>
-            <a:r>
-              <a:rPr lang="nl-NL" dirty="0" smtClean="0"/>
-              <a:t>How </a:t>
-            </a:r>
-            <a:r>
-              <a:rPr lang="nl-NL" dirty="0" err="1" smtClean="0"/>
-              <a:t>can</a:t>
-            </a:r>
-            <a:r>
-              <a:rPr lang="nl-NL" dirty="0" smtClean="0"/>
-              <a:t> we </a:t>
-            </a:r>
-            <a:r>
-              <a:rPr lang="nl-NL" dirty="0" err="1" smtClean="0"/>
-              <a:t>find</a:t>
-            </a:r>
-            <a:r>
-              <a:rPr lang="nl-NL" dirty="0" smtClean="0"/>
-              <a:t> the </a:t>
-            </a:r>
-            <a:r>
-              <a:rPr lang="nl-NL" dirty="0" err="1" smtClean="0"/>
-              <a:t>shortest</a:t>
-            </a:r>
-            <a:r>
-              <a:rPr lang="nl-NL" dirty="0" smtClean="0"/>
-              <a:t> </a:t>
-            </a:r>
-            <a:r>
-              <a:rPr lang="nl-NL" dirty="0" err="1" smtClean="0"/>
-              <a:t>paths</a:t>
-            </a:r>
-            <a:r>
-              <a:rPr lang="nl-NL" dirty="0" smtClean="0"/>
-              <a:t> </a:t>
-            </a:r>
-            <a:r>
-              <a:rPr lang="nl-NL" dirty="0" err="1" smtClean="0"/>
-              <a:t>between</a:t>
-            </a:r>
-            <a:r>
-              <a:rPr lang="nl-NL" dirty="0" smtClean="0"/>
-              <a:t> </a:t>
-            </a:r>
-            <a:r>
-              <a:rPr lang="nl-NL" b="1" dirty="0" err="1" smtClean="0"/>
-              <a:t>all</a:t>
-            </a:r>
-            <a:r>
-              <a:rPr lang="nl-NL" b="1" dirty="0" smtClean="0"/>
-              <a:t> pairs </a:t>
-            </a:r>
-            <a:r>
-              <a:rPr lang="nl-NL" dirty="0" smtClean="0"/>
-              <a:t>of </a:t>
-            </a:r>
-            <a:r>
-              <a:rPr lang="nl-NL" dirty="0" err="1" smtClean="0"/>
-              <a:t>nodes</a:t>
-            </a:r>
-            <a:r>
-              <a:rPr lang="nl-NL" dirty="0" smtClean="0"/>
-              <a:t> in a </a:t>
-            </a:r>
-            <a:r>
-              <a:rPr lang="nl-NL" dirty="0" err="1" smtClean="0"/>
-              <a:t>graph</a:t>
-            </a:r>
-            <a:r>
-              <a:rPr lang="nl-NL" dirty="0" smtClean="0"/>
-              <a:t>?</a:t>
-            </a:r>
-          </a:p>
-          <a:p>
-            <a:pPr lvl="1"/>
-            <a:r>
-              <a:rPr lang="nl-NL" dirty="0" smtClean="0"/>
-              <a:t>Floyd </a:t>
-            </a:r>
-            <a:r>
-              <a:rPr lang="nl-NL" dirty="0" err="1" smtClean="0"/>
-              <a:t>Warshall</a:t>
-            </a:r>
-            <a:r>
-              <a:rPr lang="nl-NL" dirty="0" smtClean="0"/>
-              <a:t> </a:t>
-            </a:r>
-            <a:r>
-              <a:rPr lang="nl-NL" dirty="0" err="1" smtClean="0"/>
-              <a:t>algorithm</a:t>
-            </a:r>
-            <a:endParaRPr lang="nl-NL" dirty="0"/>
-          </a:p>
-        </p:txBody>
-      </p:sp>
-      <p:sp>
-        <p:nvSpPr>
-          <p:cNvPr id="4" name="Tijdelijke aanduiding voor voettekst 3"/>
-          <p:cNvSpPr>
-            <a:spLocks noGrp="1"/>
-          </p:cNvSpPr>
-          <p:nvPr>
-            <p:ph type="ftr" sz="quarter" idx="11"/>
-          </p:nvPr>
-        </p:nvSpPr>
-        <p:spPr/>
-        <p:txBody>
-          <a:bodyPr/>
-          <a:lstStyle/>
-          <a:p>
-            <a:r>
-              <a:rPr lang="it-IT" smtClean="0"/>
-              <a:t>INFDEV026A - G. Costantini, F. Di Giacomo, G. Maggiore</a:t>
-            </a:r>
-            <a:endParaRPr lang="en-GB"/>
-          </a:p>
-        </p:txBody>
-      </p:sp>
-    </p:spTree>
-    <p:extLst>
-      <p:ext uri="{BB962C8B-B14F-4D97-AF65-F5344CB8AC3E}">
-        <p14:creationId xmlns:p14="http://schemas.microsoft.com/office/powerpoint/2010/main" val="3714923865"/>
-      </p:ext>
-    </p:extLst>
-  </p:cSld>
-  <p:clrMapOvr>
-    <a:masterClrMapping/>
-  </p:clrMapOvr>
-</p:sld>
-</file>
-
-<file path=ppt/slides/slide30.xml><?xml version="1.0" encoding="utf-8"?>
+<file path=ppt/slides/slide32.xml><?xml version="1.0" encoding="utf-8"?>
 <p:sld xmlns:a="http://schemas.openxmlformats.org/drawingml/2006/main" xmlns:r="http://schemas.openxmlformats.org/officeDocument/2006/relationships" xmlns:p="http://schemas.openxmlformats.org/presentationml/2006/main">
   <p:cSld>
     <p:spTree>
@@ -17157,17 +17932,10 @@
   <p:clrMapOvr>
     <a:masterClrMapping/>
   </p:clrMapOvr>
-  <p:timing>
-    <p:tnLst>
-      <p:par>
-        <p:cTn id="1" dur="indefinite" restart="never" nodeType="tmRoot"/>
-      </p:par>
-    </p:tnLst>
-  </p:timing>
 </p:sld>
 </file>
 
-<file path=ppt/slides/slide31.xml><?xml version="1.0" encoding="utf-8"?>
+<file path=ppt/slides/slide33.xml><?xml version="1.0" encoding="utf-8"?>
 <p:sld xmlns:a="http://schemas.openxmlformats.org/drawingml/2006/main" xmlns:r="http://schemas.openxmlformats.org/officeDocument/2006/relationships" xmlns:p="http://schemas.openxmlformats.org/presentationml/2006/main">
   <p:cSld>
     <p:spTree>
@@ -17385,13 +18153,6 @@
   <p:clrMapOvr>
     <a:masterClrMapping/>
   </p:clrMapOvr>
-  <p:timing>
-    <p:tnLst>
-      <p:par>
-        <p:cTn id="1" dur="indefinite" restart="never" nodeType="tmRoot"/>
-      </p:par>
-    </p:tnLst>
-  </p:timing>
 </p:sld>
 </file>
 
@@ -17475,13 +18236,6 @@
   <p:clrMapOvr>
     <a:masterClrMapping/>
   </p:clrMapOvr>
-  <p:timing>
-    <p:tnLst>
-      <p:par>
-        <p:cTn id="1" dur="indefinite" restart="never" nodeType="tmRoot"/>
-      </p:par>
-    </p:tnLst>
-  </p:timing>
 </p:sld>
 </file>
 
@@ -18046,14 +18800,14 @@
                 <a:gridCol w="1211858">
                   <a:extLst>
                     <a:ext uri="{9D8B030D-6E8A-4147-A177-3AD203B41FA5}">
-                      <a16:colId xmlns="" xmlns:a16="http://schemas.microsoft.com/office/drawing/2014/main" val="3737604255"/>
+                      <a16:colId xmlns:a16="http://schemas.microsoft.com/office/drawing/2014/main" val="3737604255"/>
                     </a:ext>
                   </a:extLst>
                 </a:gridCol>
                 <a:gridCol w="2040674">
                   <a:extLst>
                     <a:ext uri="{9D8B030D-6E8A-4147-A177-3AD203B41FA5}">
-                      <a16:colId xmlns="" xmlns:a16="http://schemas.microsoft.com/office/drawing/2014/main" val="389226352"/>
+                      <a16:colId xmlns:a16="http://schemas.microsoft.com/office/drawing/2014/main" val="389226352"/>
                     </a:ext>
                   </a:extLst>
                 </a:gridCol>
@@ -18123,7 +18877,7 @@
                 </a:tc>
                 <a:extLst>
                   <a:ext uri="{0D108BD9-81ED-4DB2-BD59-A6C34878D82A}">
-                    <a16:rowId xmlns="" xmlns:a16="http://schemas.microsoft.com/office/drawing/2014/main" val="3883935320"/>
+                    <a16:rowId xmlns:a16="http://schemas.microsoft.com/office/drawing/2014/main" val="3883935320"/>
                   </a:ext>
                 </a:extLst>
               </a:tr>
@@ -18176,7 +18930,7 @@
                 </a:tc>
                 <a:extLst>
                   <a:ext uri="{0D108BD9-81ED-4DB2-BD59-A6C34878D82A}">
-                    <a16:rowId xmlns="" xmlns:a16="http://schemas.microsoft.com/office/drawing/2014/main" val="785959856"/>
+                    <a16:rowId xmlns:a16="http://schemas.microsoft.com/office/drawing/2014/main" val="785959856"/>
                   </a:ext>
                 </a:extLst>
               </a:tr>
@@ -18229,7 +18983,7 @@
                 </a:tc>
                 <a:extLst>
                   <a:ext uri="{0D108BD9-81ED-4DB2-BD59-A6C34878D82A}">
-                    <a16:rowId xmlns="" xmlns:a16="http://schemas.microsoft.com/office/drawing/2014/main" val="60468838"/>
+                    <a16:rowId xmlns:a16="http://schemas.microsoft.com/office/drawing/2014/main" val="60468838"/>
                   </a:ext>
                 </a:extLst>
               </a:tr>
@@ -18282,7 +19036,7 @@
                 </a:tc>
                 <a:extLst>
                   <a:ext uri="{0D108BD9-81ED-4DB2-BD59-A6C34878D82A}">
-                    <a16:rowId xmlns="" xmlns:a16="http://schemas.microsoft.com/office/drawing/2014/main" val="124635373"/>
+                    <a16:rowId xmlns:a16="http://schemas.microsoft.com/office/drawing/2014/main" val="124635373"/>
                   </a:ext>
                 </a:extLst>
               </a:tr>
@@ -18335,7 +19089,7 @@
                 </a:tc>
                 <a:extLst>
                   <a:ext uri="{0D108BD9-81ED-4DB2-BD59-A6C34878D82A}">
-                    <a16:rowId xmlns="" xmlns:a16="http://schemas.microsoft.com/office/drawing/2014/main" val="1501560492"/>
+                    <a16:rowId xmlns:a16="http://schemas.microsoft.com/office/drawing/2014/main" val="1501560492"/>
                   </a:ext>
                 </a:extLst>
               </a:tr>
@@ -18388,7 +19142,7 @@
                 </a:tc>
                 <a:extLst>
                   <a:ext uri="{0D108BD9-81ED-4DB2-BD59-A6C34878D82A}">
-                    <a16:rowId xmlns="" xmlns:a16="http://schemas.microsoft.com/office/drawing/2014/main" val="3751559142"/>
+                    <a16:rowId xmlns:a16="http://schemas.microsoft.com/office/drawing/2014/main" val="3751559142"/>
                   </a:ext>
                 </a:extLst>
               </a:tr>

</xml_diff>

<commit_message>
update slides week 6
</commit_message>
<xml_diff>
--- a/Slides/Week 6 - Dynamic Programming, Floyd Warshall.pptx
+++ b/Slides/Week 6 - Dynamic Programming, Floyd Warshall.pptx
@@ -241,7 +241,7 @@
           <a:p>
             <a:fld id="{F314420D-16BA-4EDC-9A71-800590EAD5A3}" type="datetimeFigureOut">
               <a:rPr lang="en-GB" smtClean="0"/>
-              <a:t>04/01/2016</a:t>
+              <a:t>05/01/2016</a:t>
             </a:fld>
             <a:endParaRPr lang="en-GB"/>
           </a:p>
@@ -400,7 +400,7 @@
           <a:p>
             <a:fld id="{29573B9A-66FB-4A63-BCD5-E140B9429FD2}" type="slidenum">
               <a:rPr lang="en-GB" smtClean="0"/>
-              <a:t>‹#›</a:t>
+              <a:t>‹nr.›</a:t>
             </a:fld>
             <a:endParaRPr lang="en-GB"/>
           </a:p>
@@ -2149,7 +2149,7 @@
           <a:p>
             <a:fld id="{EBA5BF6C-AF16-4C58-8955-5157BF3CF460}" type="datetime1">
               <a:rPr lang="en-GB" smtClean="0"/>
-              <a:t>04/01/2016</a:t>
+              <a:t>05/01/2016</a:t>
             </a:fld>
             <a:endParaRPr lang="en-GB"/>
           </a:p>
@@ -2195,7 +2195,7 @@
           <a:p>
             <a:fld id="{A3AAA307-BC5C-435E-9F75-3D6007B651A5}" type="slidenum">
               <a:rPr lang="en-GB" smtClean="0"/>
-              <a:t>‹#›</a:t>
+              <a:t>‹nr.›</a:t>
             </a:fld>
             <a:endParaRPr lang="en-GB"/>
           </a:p>
@@ -2404,7 +2404,7 @@
           <a:p>
             <a:fld id="{28754959-7583-41D4-A531-84ECF582A02F}" type="datetime1">
               <a:rPr lang="en-GB" smtClean="0"/>
-              <a:t>04/01/2016</a:t>
+              <a:t>05/01/2016</a:t>
             </a:fld>
             <a:endParaRPr lang="en-GB"/>
           </a:p>
@@ -2450,7 +2450,7 @@
           <a:p>
             <a:fld id="{A3AAA307-BC5C-435E-9F75-3D6007B651A5}" type="slidenum">
               <a:rPr lang="en-GB" smtClean="0"/>
-              <a:t>‹#›</a:t>
+              <a:t>‹nr.›</a:t>
             </a:fld>
             <a:endParaRPr lang="en-GB"/>
           </a:p>
@@ -2722,7 +2722,7 @@
           <a:p>
             <a:fld id="{2579CF84-8647-4BB0-98CB-E39DBFD9DC8C}" type="datetime1">
               <a:rPr lang="en-GB" smtClean="0"/>
-              <a:t>04/01/2016</a:t>
+              <a:t>05/01/2016</a:t>
             </a:fld>
             <a:endParaRPr lang="en-GB"/>
           </a:p>
@@ -2768,7 +2768,7 @@
           <a:p>
             <a:fld id="{A3AAA307-BC5C-435E-9F75-3D6007B651A5}" type="slidenum">
               <a:rPr lang="en-GB" smtClean="0"/>
-              <a:t>‹#›</a:t>
+              <a:t>‹nr.›</a:t>
             </a:fld>
             <a:endParaRPr lang="en-GB"/>
           </a:p>
@@ -3053,7 +3053,7 @@
           <a:p>
             <a:fld id="{6A61B992-C398-42F8-8105-DFF46194B470}" type="datetime1">
               <a:rPr lang="en-GB" smtClean="0"/>
-              <a:t>04/01/2016</a:t>
+              <a:t>05/01/2016</a:t>
             </a:fld>
             <a:endParaRPr lang="en-GB"/>
           </a:p>
@@ -3099,7 +3099,7 @@
           <a:p>
             <a:fld id="{A3AAA307-BC5C-435E-9F75-3D6007B651A5}" type="slidenum">
               <a:rPr lang="en-GB" smtClean="0"/>
-              <a:t>‹#›</a:t>
+              <a:t>‹nr.›</a:t>
             </a:fld>
             <a:endParaRPr lang="en-GB"/>
           </a:p>
@@ -3371,7 +3371,7 @@
           <a:p>
             <a:fld id="{735F25EF-2C32-49FF-A05C-AACCD6DB6B6B}" type="datetime1">
               <a:rPr lang="en-GB" smtClean="0"/>
-              <a:t>04/01/2016</a:t>
+              <a:t>05/01/2016</a:t>
             </a:fld>
             <a:endParaRPr lang="en-GB"/>
           </a:p>
@@ -3417,7 +3417,7 @@
           <a:p>
             <a:fld id="{A3AAA307-BC5C-435E-9F75-3D6007B651A5}" type="slidenum">
               <a:rPr lang="en-GB" smtClean="0"/>
-              <a:t>‹#›</a:t>
+              <a:t>‹nr.›</a:t>
             </a:fld>
             <a:endParaRPr lang="en-GB"/>
           </a:p>
@@ -3762,7 +3762,7 @@
           <a:p>
             <a:fld id="{29E0FEDD-8B46-4AB8-8509-00A28AB84484}" type="datetime1">
               <a:rPr lang="en-GB" smtClean="0"/>
-              <a:t>04/01/2016</a:t>
+              <a:t>05/01/2016</a:t>
             </a:fld>
             <a:endParaRPr lang="en-GB"/>
           </a:p>
@@ -3808,7 +3808,7 @@
           <a:p>
             <a:fld id="{A3AAA307-BC5C-435E-9F75-3D6007B651A5}" type="slidenum">
               <a:rPr lang="en-GB" smtClean="0"/>
-              <a:t>‹#›</a:t>
+              <a:t>‹nr.›</a:t>
             </a:fld>
             <a:endParaRPr lang="en-GB"/>
           </a:p>
@@ -3936,7 +3936,7 @@
           <a:p>
             <a:fld id="{DBEF859E-FC17-4049-B5D8-0DB1DB648A1C}" type="datetime1">
               <a:rPr lang="en-GB" smtClean="0"/>
-              <a:t>04/01/2016</a:t>
+              <a:t>05/01/2016</a:t>
             </a:fld>
             <a:endParaRPr lang="en-GB"/>
           </a:p>
@@ -3982,7 +3982,7 @@
           <a:p>
             <a:fld id="{A3AAA307-BC5C-435E-9F75-3D6007B651A5}" type="slidenum">
               <a:rPr lang="en-GB" smtClean="0"/>
-              <a:t>‹#›</a:t>
+              <a:t>‹nr.›</a:t>
             </a:fld>
             <a:endParaRPr lang="en-GB"/>
           </a:p>
@@ -4120,7 +4120,7 @@
           <a:p>
             <a:fld id="{31601F83-63BF-475D-9B29-D444390134B0}" type="datetime1">
               <a:rPr lang="en-GB" smtClean="0"/>
-              <a:t>04/01/2016</a:t>
+              <a:t>05/01/2016</a:t>
             </a:fld>
             <a:endParaRPr lang="en-GB"/>
           </a:p>
@@ -4166,7 +4166,7 @@
           <a:p>
             <a:fld id="{A3AAA307-BC5C-435E-9F75-3D6007B651A5}" type="slidenum">
               <a:rPr lang="en-GB" smtClean="0"/>
-              <a:t>‹#›</a:t>
+              <a:t>‹nr.›</a:t>
             </a:fld>
             <a:endParaRPr lang="en-GB"/>
           </a:p>
@@ -4294,7 +4294,7 @@
           <a:p>
             <a:fld id="{0C3CD51F-4875-411B-AE14-AC6BE17149BE}" type="datetime1">
               <a:rPr lang="en-GB" smtClean="0"/>
-              <a:t>04/01/2016</a:t>
+              <a:t>05/01/2016</a:t>
             </a:fld>
             <a:endParaRPr lang="en-GB"/>
           </a:p>
@@ -4340,7 +4340,7 @@
           <a:p>
             <a:fld id="{A3AAA307-BC5C-435E-9F75-3D6007B651A5}" type="slidenum">
               <a:rPr lang="en-GB" smtClean="0"/>
-              <a:t>‹#›</a:t>
+              <a:t>‹nr.›</a:t>
             </a:fld>
             <a:endParaRPr lang="en-GB"/>
           </a:p>
@@ -4545,7 +4545,7 @@
           <a:p>
             <a:fld id="{D7A13E29-F9DA-4235-B179-6801D5C335E0}" type="datetime1">
               <a:rPr lang="en-GB" smtClean="0"/>
-              <a:t>04/01/2016</a:t>
+              <a:t>05/01/2016</a:t>
             </a:fld>
             <a:endParaRPr lang="en-GB"/>
           </a:p>
@@ -4591,7 +4591,7 @@
           <a:p>
             <a:fld id="{A3AAA307-BC5C-435E-9F75-3D6007B651A5}" type="slidenum">
               <a:rPr lang="en-GB" smtClean="0"/>
-              <a:t>‹#›</a:t>
+              <a:t>‹nr.›</a:t>
             </a:fld>
             <a:endParaRPr lang="en-GB"/>
           </a:p>
@@ -4781,7 +4781,7 @@
           <a:p>
             <a:fld id="{17E7B115-DA76-4A15-B0DB-1E0942A758E6}" type="datetime1">
               <a:rPr lang="en-GB" smtClean="0"/>
-              <a:t>04/01/2016</a:t>
+              <a:t>05/01/2016</a:t>
             </a:fld>
             <a:endParaRPr lang="en-GB"/>
           </a:p>
@@ -4827,7 +4827,7 @@
           <a:p>
             <a:fld id="{A3AAA307-BC5C-435E-9F75-3D6007B651A5}" type="slidenum">
               <a:rPr lang="en-GB" smtClean="0"/>
-              <a:t>‹#›</a:t>
+              <a:t>‹nr.›</a:t>
             </a:fld>
             <a:endParaRPr lang="en-GB"/>
           </a:p>
@@ -5159,7 +5159,7 @@
           <a:p>
             <a:fld id="{E9C155A6-10E7-4AE0-A978-61287BEECA4C}" type="datetime1">
               <a:rPr lang="en-GB" smtClean="0"/>
-              <a:t>04/01/2016</a:t>
+              <a:t>05/01/2016</a:t>
             </a:fld>
             <a:endParaRPr lang="en-GB"/>
           </a:p>
@@ -5205,7 +5205,7 @@
           <a:p>
             <a:fld id="{A3AAA307-BC5C-435E-9F75-3D6007B651A5}" type="slidenum">
               <a:rPr lang="en-GB" smtClean="0"/>
-              <a:t>‹#›</a:t>
+              <a:t>‹nr.›</a:t>
             </a:fld>
             <a:endParaRPr lang="en-GB"/>
           </a:p>
@@ -5286,7 +5286,7 @@
           <a:p>
             <a:fld id="{73961DA1-B789-43DA-B41F-367E45E14A87}" type="datetime1">
               <a:rPr lang="en-GB" smtClean="0"/>
-              <a:t>04/01/2016</a:t>
+              <a:t>05/01/2016</a:t>
             </a:fld>
             <a:endParaRPr lang="en-GB"/>
           </a:p>
@@ -5332,7 +5332,7 @@
           <a:p>
             <a:fld id="{A3AAA307-BC5C-435E-9F75-3D6007B651A5}" type="slidenum">
               <a:rPr lang="en-GB" smtClean="0"/>
-              <a:t>‹#›</a:t>
+              <a:t>‹nr.›</a:t>
             </a:fld>
             <a:endParaRPr lang="en-GB"/>
           </a:p>
@@ -5385,7 +5385,7 @@
           <a:p>
             <a:fld id="{DA1BD0E5-CF08-4746-888E-2D733D556074}" type="datetime1">
               <a:rPr lang="en-GB" smtClean="0"/>
-              <a:t>04/01/2016</a:t>
+              <a:t>05/01/2016</a:t>
             </a:fld>
             <a:endParaRPr lang="en-GB"/>
           </a:p>
@@ -5431,7 +5431,7 @@
           <a:p>
             <a:fld id="{A3AAA307-BC5C-435E-9F75-3D6007B651A5}" type="slidenum">
               <a:rPr lang="en-GB" smtClean="0"/>
-              <a:t>‹#›</a:t>
+              <a:t>‹nr.›</a:t>
             </a:fld>
             <a:endParaRPr lang="en-GB"/>
           </a:p>
@@ -5644,7 +5644,7 @@
           <a:p>
             <a:fld id="{91A550A3-096A-496C-87AD-3A39D20C628E}" type="datetime1">
               <a:rPr lang="en-GB" smtClean="0"/>
-              <a:t>04/01/2016</a:t>
+              <a:t>05/01/2016</a:t>
             </a:fld>
             <a:endParaRPr lang="en-GB"/>
           </a:p>
@@ -5690,7 +5690,7 @@
           <a:p>
             <a:fld id="{A3AAA307-BC5C-435E-9F75-3D6007B651A5}" type="slidenum">
               <a:rPr lang="en-GB" smtClean="0"/>
-              <a:t>‹#›</a:t>
+              <a:t>‹nr.›</a:t>
             </a:fld>
             <a:endParaRPr lang="en-GB"/>
           </a:p>
@@ -5911,7 +5911,7 @@
           <a:p>
             <a:fld id="{9A7CFD0D-77B1-493B-A7CA-4E8359C26366}" type="datetime1">
               <a:rPr lang="en-GB" smtClean="0"/>
-              <a:t>04/01/2016</a:t>
+              <a:t>05/01/2016</a:t>
             </a:fld>
             <a:endParaRPr lang="en-GB"/>
           </a:p>
@@ -5957,7 +5957,7 @@
           <a:p>
             <a:fld id="{A3AAA307-BC5C-435E-9F75-3D6007B651A5}" type="slidenum">
               <a:rPr lang="en-GB" smtClean="0"/>
-              <a:t>‹#›</a:t>
+              <a:t>‹nr.›</a:t>
             </a:fld>
             <a:endParaRPr lang="en-GB"/>
           </a:p>
@@ -6660,7 +6660,7 @@
           <a:p>
             <a:fld id="{EF7A9A45-2E76-4088-871F-04CACEBEB6E2}" type="datetime1">
               <a:rPr lang="en-GB" smtClean="0"/>
-              <a:t>04/01/2016</a:t>
+              <a:t>05/01/2016</a:t>
             </a:fld>
             <a:endParaRPr lang="en-GB"/>
           </a:p>
@@ -6742,7 +6742,7 @@
           <a:p>
             <a:fld id="{A3AAA307-BC5C-435E-9F75-3D6007B651A5}" type="slidenum">
               <a:rPr lang="en-GB" smtClean="0"/>
-              <a:t>‹#›</a:t>
+              <a:t>‹nr.›</a:t>
             </a:fld>
             <a:endParaRPr lang="en-GB"/>
           </a:p>
@@ -7324,6 +7324,13 @@
   <p:clrMapOvr>
     <a:masterClrMapping/>
   </p:clrMapOvr>
+  <p:timing>
+    <p:tnLst>
+      <p:par>
+        <p:cTn id="1" dur="indefinite" restart="never" nodeType="tmRoot"/>
+      </p:par>
+    </p:tnLst>
+  </p:timing>
 </p:sld>
 </file>
 
@@ -7606,6 +7613,13 @@
   <p:clrMapOvr>
     <a:masterClrMapping/>
   </p:clrMapOvr>
+  <p:timing>
+    <p:tnLst>
+      <p:par>
+        <p:cTn id="1" dur="indefinite" restart="never" nodeType="tmRoot"/>
+      </p:par>
+    </p:tnLst>
+  </p:timing>
 </p:sld>
 </file>
 
@@ -7991,6 +8005,13 @@
   <p:clrMapOvr>
     <a:masterClrMapping/>
   </p:clrMapOvr>
+  <p:timing>
+    <p:tnLst>
+      <p:par>
+        <p:cTn id="1" dur="indefinite" restart="never" nodeType="tmRoot"/>
+      </p:par>
+    </p:tnLst>
+  </p:timing>
 </p:sld>
 </file>
 
@@ -8628,6 +8649,13 @@
   <p:clrMapOvr>
     <a:masterClrMapping/>
   </p:clrMapOvr>
+  <p:timing>
+    <p:tnLst>
+      <p:par>
+        <p:cTn id="1" dur="indefinite" restart="never" nodeType="tmRoot"/>
+      </p:par>
+    </p:tnLst>
+  </p:timing>
 </p:sld>
 </file>
 
@@ -8745,6 +8773,13 @@
   <p:clrMapOvr>
     <a:masterClrMapping/>
   </p:clrMapOvr>
+  <p:timing>
+    <p:tnLst>
+      <p:par>
+        <p:cTn id="1" dur="indefinite" restart="never" nodeType="tmRoot"/>
+      </p:par>
+    </p:tnLst>
+  </p:timing>
 </p:sld>
 </file>
 
@@ -9077,6 +9112,13 @@
   <p:clrMapOvr>
     <a:masterClrMapping/>
   </p:clrMapOvr>
+  <p:timing>
+    <p:tnLst>
+      <p:par>
+        <p:cTn id="1" dur="indefinite" restart="never" nodeType="tmRoot"/>
+      </p:par>
+    </p:tnLst>
+  </p:timing>
 </p:sld>
 </file>
 
@@ -9232,6 +9274,13 @@
   <p:clrMapOvr>
     <a:masterClrMapping/>
   </p:clrMapOvr>
+  <p:timing>
+    <p:tnLst>
+      <p:par>
+        <p:cTn id="1" dur="indefinite" restart="never" nodeType="tmRoot"/>
+      </p:par>
+    </p:tnLst>
+  </p:timing>
 </p:sld>
 </file>
 
@@ -9772,6 +9821,13 @@
   <p:clrMapOvr>
     <a:masterClrMapping/>
   </p:clrMapOvr>
+  <p:timing>
+    <p:tnLst>
+      <p:par>
+        <p:cTn id="1" dur="indefinite" restart="never" nodeType="tmRoot"/>
+      </p:par>
+    </p:tnLst>
+  </p:timing>
 </p:sld>
 </file>
 
@@ -10017,8 +10073,12 @@
                   <a:buAutoNum type="arabicPeriod"/>
                 </a:pPr>
                 <a:r>
+                  <a:rPr lang="en-US" smtClean="0"/>
+                  <a:t>a </a:t>
+                </a:r>
+                <a:r>
                   <a:rPr lang="en-US" dirty="0"/>
-                  <a:t> a path that goes from </a:t>
+                  <a:t>path that goes from </a:t>
                 </a:r>
                 <a14:m>
                   <m:oMath xmlns:m="http://schemas.openxmlformats.org/officeDocument/2006/math">
@@ -10301,6 +10361,13 @@
   <p:clrMapOvr>
     <a:masterClrMapping/>
   </p:clrMapOvr>
+  <p:timing>
+    <p:tnLst>
+      <p:par>
+        <p:cTn id="1" dur="indefinite" restart="never" nodeType="tmRoot"/>
+      </p:par>
+    </p:tnLst>
+  </p:timing>
 </p:sld>
 </file>
 
@@ -10583,6 +10650,13 @@
   <p:clrMapOvr>
     <a:masterClrMapping/>
   </p:clrMapOvr>
+  <p:timing>
+    <p:tnLst>
+      <p:par>
+        <p:cTn id="1" dur="indefinite" restart="never" nodeType="tmRoot"/>
+      </p:par>
+    </p:tnLst>
+  </p:timing>
 </p:sld>
 </file>
 
@@ -11148,6 +11222,13 @@
   <p:clrMapOvr>
     <a:masterClrMapping/>
   </p:clrMapOvr>
+  <p:timing>
+    <p:tnLst>
+      <p:par>
+        <p:cTn id="1" dur="indefinite" restart="never" nodeType="tmRoot"/>
+      </p:par>
+    </p:tnLst>
+  </p:timing>
 </p:sld>
 </file>
 
@@ -11218,18 +11299,9 @@
           <a:p>
             <a:pPr lvl="1"/>
             <a:r>
-              <a:rPr lang="en-GB" b="1" strike="sngStrike" dirty="0">
-                <a:solidFill>
-                  <a:schemeClr val="tx1"/>
-                </a:solidFill>
-              </a:rPr>
+              <a:rPr lang="en-GB" b="1" strike="sngStrike" dirty="0"/>
               <a:t>Empirical and complexity analysis</a:t>
             </a:r>
-            <a:endParaRPr lang="en-GB" strike="sngStrike" dirty="0">
-              <a:solidFill>
-                <a:schemeClr val="tx1"/>
-              </a:solidFill>
-            </a:endParaRPr>
           </a:p>
           <a:p>
             <a:r>
@@ -11244,11 +11316,7 @@
           <a:p>
             <a:pPr lvl="1"/>
             <a:r>
-              <a:rPr lang="en-GB" b="1" strike="sngStrike" dirty="0">
-                <a:solidFill>
-                  <a:schemeClr val="tx1"/>
-                </a:solidFill>
-              </a:rPr>
+              <a:rPr lang="en-GB" b="1" strike="sngStrike" dirty="0"/>
               <a:t>Sorting algorithms</a:t>
             </a:r>
           </a:p>
@@ -11327,6 +11395,13 @@
   <p:clrMapOvr>
     <a:masterClrMapping/>
   </p:clrMapOvr>
+  <p:timing>
+    <p:tnLst>
+      <p:par>
+        <p:cTn id="1" dur="indefinite" restart="never" nodeType="tmRoot"/>
+      </p:par>
+    </p:tnLst>
+  </p:timing>
 </p:sld>
 </file>
 
@@ -11788,6 +11863,13 @@
   <p:clrMapOvr>
     <a:masterClrMapping/>
   </p:clrMapOvr>
+  <p:timing>
+    <p:tnLst>
+      <p:par>
+        <p:cTn id="1" dur="indefinite" restart="never" nodeType="tmRoot"/>
+      </p:par>
+    </p:tnLst>
+  </p:timing>
 </p:sld>
 </file>
 
@@ -12836,6 +12918,13 @@
   <p:clrMapOvr>
     <a:masterClrMapping/>
   </p:clrMapOvr>
+  <p:timing>
+    <p:tnLst>
+      <p:par>
+        <p:cTn id="1" dur="indefinite" restart="never" nodeType="tmRoot"/>
+      </p:par>
+    </p:tnLst>
+  </p:timing>
 </p:sld>
 </file>
 
@@ -12866,7 +12955,12 @@
             <p:ph type="title"/>
           </p:nvPr>
         </p:nvSpPr>
-        <p:spPr/>
+        <p:spPr>
+          <a:xfrm>
+            <a:off x="677333" y="609600"/>
+            <a:ext cx="9135739" cy="1320800"/>
+          </a:xfrm>
+        </p:spPr>
         <p:txBody>
           <a:bodyPr>
             <a:normAutofit/>
@@ -13660,6 +13754,13 @@
   <p:clrMapOvr>
     <a:masterClrMapping/>
   </p:clrMapOvr>
+  <p:timing>
+    <p:tnLst>
+      <p:par>
+        <p:cTn id="1" dur="indefinite" restart="never" nodeType="tmRoot"/>
+      </p:par>
+    </p:tnLst>
+  </p:timing>
 </p:sld>
 </file>
 
@@ -13697,7 +13798,7 @@
           <a:p>
             <a:r>
               <a:rPr lang="en-US" dirty="0" smtClean="0"/>
-              <a:t>Floyd </a:t>
+              <a:t>Floyd-</a:t>
             </a:r>
             <a:r>
               <a:rPr lang="en-US" dirty="0" err="1" smtClean="0"/>
@@ -13715,73 +13816,169 @@
           </a:p>
         </p:txBody>
       </p:sp>
-      <p:sp>
-        <p:nvSpPr>
-          <p:cNvPr id="3" name="Content Placeholder 2"/>
-          <p:cNvSpPr>
-            <a:spLocks noGrp="1"/>
-          </p:cNvSpPr>
-          <p:nvPr>
-            <p:ph idx="1"/>
-          </p:nvPr>
-        </p:nvSpPr>
-        <p:spPr/>
-        <p:txBody>
-          <a:bodyPr/>
-          <a:lstStyle/>
-          <a:p>
-            <a:r>
-              <a:rPr lang="en-US" dirty="0" smtClean="0"/>
-              <a:t>We can save the intermediate results we compute into a matrix.</a:t>
-            </a:r>
-          </a:p>
-          <a:p>
-            <a:r>
-              <a:rPr lang="en-US" dirty="0" smtClean="0"/>
-              <a:t>This matrix contains the length of the path from vertex </a:t>
-            </a:r>
-            <a:r>
-              <a:rPr lang="en-US" dirty="0" err="1" smtClean="0"/>
-              <a:t>i</a:t>
-            </a:r>
-            <a:r>
-              <a:rPr lang="en-US" dirty="0" smtClean="0"/>
-              <a:t> to vertex j.</a:t>
-            </a:r>
-          </a:p>
-          <a:p>
-            <a:r>
-              <a:rPr lang="en-US" dirty="0" smtClean="0"/>
-              <a:t>The algorithm uses an iterative bottom up approach. </a:t>
-            </a:r>
-          </a:p>
-          <a:p>
-            <a:r>
-              <a:rPr lang="en-US" dirty="0" smtClean="0"/>
-              <a:t>We start by filling the matrix with the base case solutions, i.e. with 0 the distance between a vertex and itself, and with w(</a:t>
-            </a:r>
-            <a:r>
-              <a:rPr lang="en-US" dirty="0" err="1"/>
-              <a:t>i</a:t>
-            </a:r>
-            <a:r>
-              <a:rPr lang="en-US" dirty="0" err="1" smtClean="0"/>
-              <a:t>,j</a:t>
-            </a:r>
-            <a:r>
-              <a:rPr lang="en-US" dirty="0" smtClean="0"/>
-              <a:t>) the distance between adjacent vertices.</a:t>
-            </a:r>
-          </a:p>
-          <a:p>
-            <a:r>
-              <a:rPr lang="en-US" dirty="0" smtClean="0"/>
-              <a:t>We fill in the matrix by iteratively expanding the set of intermediate vertices to use in the path.</a:t>
-            </a:r>
-            <a:endParaRPr lang="it-IT" dirty="0"/>
-          </a:p>
-        </p:txBody>
-      </p:sp>
+      <mc:AlternateContent xmlns:mc="http://schemas.openxmlformats.org/markup-compatibility/2006" xmlns:a14="http://schemas.microsoft.com/office/drawing/2010/main">
+        <mc:Choice Requires="a14">
+          <p:sp>
+            <p:nvSpPr>
+              <p:cNvPr id="3" name="Content Placeholder 2"/>
+              <p:cNvSpPr>
+                <a:spLocks noGrp="1"/>
+              </p:cNvSpPr>
+              <p:nvPr>
+                <p:ph idx="1"/>
+              </p:nvPr>
+            </p:nvSpPr>
+            <p:spPr>
+              <a:xfrm>
+                <a:off x="677334" y="2160589"/>
+                <a:ext cx="8265944" cy="3880773"/>
+              </a:xfrm>
+            </p:spPr>
+            <p:txBody>
+              <a:bodyPr>
+                <a:normAutofit lnSpcReduction="10000"/>
+              </a:bodyPr>
+              <a:lstStyle/>
+              <a:p>
+                <a:r>
+                  <a:rPr lang="en-US" dirty="0" smtClean="0"/>
+                  <a:t>How do we avoid to compute the same thing multiple times?</a:t>
+                </a:r>
+              </a:p>
+              <a:p>
+                <a:pPr lvl="1"/>
+                <a:r>
+                  <a:rPr lang="en-US" dirty="0" smtClean="0"/>
+                  <a:t>Saving the intermediate results into a matrix!</a:t>
+                </a:r>
+              </a:p>
+              <a:p>
+                <a:pPr lvl="1"/>
+                <a:r>
+                  <a:rPr lang="en-US" dirty="0" smtClean="0"/>
+                  <a:t>This matrix contains the </a:t>
+                </a:r>
+                <a:r>
+                  <a:rPr lang="en-US" i="1" dirty="0" smtClean="0"/>
+                  <a:t>length of the path from vertex </a:t>
+                </a:r>
+                <a:r>
+                  <a:rPr lang="en-US" i="1" dirty="0" err="1" smtClean="0"/>
+                  <a:t>i</a:t>
+                </a:r>
+                <a:r>
+                  <a:rPr lang="en-US" i="1" dirty="0" smtClean="0"/>
+                  <a:t> to vertex j</a:t>
+                </a:r>
+              </a:p>
+              <a:p>
+                <a:endParaRPr lang="en-US" dirty="0" smtClean="0"/>
+              </a:p>
+              <a:p>
+                <a:r>
+                  <a:rPr lang="en-US" dirty="0" smtClean="0"/>
+                  <a:t>The algorithm uses an iterative bottom up approach</a:t>
+                </a:r>
+              </a:p>
+              <a:p>
+                <a:pPr lvl="1"/>
+                <a:r>
+                  <a:rPr lang="en-US" dirty="0" smtClean="0"/>
+                  <a:t>Start by: filling the matrix with the </a:t>
+                </a:r>
+                <a:r>
+                  <a:rPr lang="en-US" i="1" dirty="0" smtClean="0"/>
+                  <a:t>base case solutions</a:t>
+                </a:r>
+              </a:p>
+              <a:p>
+                <a:pPr lvl="2"/>
+                <a:r>
+                  <a:rPr lang="en-US" dirty="0" smtClean="0"/>
+                  <a:t>0 is the distance between a vertex and itself</a:t>
+                </a:r>
+              </a:p>
+              <a:p>
+                <a:pPr lvl="2"/>
+                <a:r>
+                  <a:rPr lang="en-US" dirty="0" smtClean="0"/>
+                  <a:t>w(</a:t>
+                </a:r>
+                <a:r>
+                  <a:rPr lang="en-US" dirty="0" err="1" smtClean="0"/>
+                  <a:t>i,j</a:t>
+                </a:r>
+                <a:r>
+                  <a:rPr lang="en-US" dirty="0" smtClean="0"/>
+                  <a:t>) is the distance between adjacent vertices</a:t>
+                </a:r>
+              </a:p>
+              <a:p>
+                <a:pPr lvl="2"/>
+                <a14:m>
+                  <m:oMath xmlns:m="http://schemas.openxmlformats.org/officeDocument/2006/math">
+                    <m:r>
+                      <a:rPr lang="nl-NL" b="0" i="1" smtClean="0">
+                        <a:latin typeface="Cambria Math" panose="02040503050406030204" pitchFamily="18" charset="0"/>
+                      </a:rPr>
+                      <m:t>∞</m:t>
+                    </m:r>
+                  </m:oMath>
+                </a14:m>
+                <a:r>
+                  <a:rPr lang="en-US" dirty="0" smtClean="0"/>
+                  <a:t> is the distance between non-adjacent vertices</a:t>
+                </a:r>
+              </a:p>
+              <a:p>
+                <a:pPr lvl="1"/>
+                <a:r>
+                  <a:rPr lang="en-US" dirty="0" smtClean="0"/>
+                  <a:t>Iterative part: filling in the matrix by iteratively expanding the set of intermediate vertices to use in the path</a:t>
+                </a:r>
+                <a:endParaRPr lang="it-IT" dirty="0"/>
+              </a:p>
+            </p:txBody>
+          </p:sp>
+        </mc:Choice>
+        <mc:Fallback xmlns="">
+          <p:sp>
+            <p:nvSpPr>
+              <p:cNvPr id="3" name="Content Placeholder 2"/>
+              <p:cNvSpPr>
+                <a:spLocks noGrp="1" noRot="1" noChangeAspect="1" noMove="1" noResize="1" noEditPoints="1" noAdjustHandles="1" noChangeArrowheads="1" noChangeShapeType="1" noTextEdit="1"/>
+              </p:cNvSpPr>
+              <p:nvPr>
+                <p:ph idx="1"/>
+              </p:nvPr>
+            </p:nvSpPr>
+            <p:spPr>
+              <a:xfrm>
+                <a:off x="677334" y="2160589"/>
+                <a:ext cx="8265944" cy="3880773"/>
+              </a:xfrm>
+              <a:blipFill rotWithShape="0">
+                <a:blip r:embed="rId2"/>
+                <a:stretch>
+                  <a:fillRect l="-147" t="-1570"/>
+                </a:stretch>
+              </a:blipFill>
+            </p:spPr>
+            <p:txBody>
+              <a:bodyPr/>
+              <a:lstStyle/>
+              <a:p>
+                <a:r>
+                  <a:rPr lang="nl-NL">
+                    <a:noFill/>
+                  </a:rPr>
+                  <a:t> </a:t>
+                </a:r>
+              </a:p>
+            </p:txBody>
+          </p:sp>
+        </mc:Fallback>
+      </mc:AlternateContent>
       <p:sp>
         <p:nvSpPr>
           <p:cNvPr id="4" name="Footer Placeholder 3"/>
@@ -13815,6 +14012,13 @@
   <p:clrMapOvr>
     <a:masterClrMapping/>
   </p:clrMapOvr>
+  <p:timing>
+    <p:tnLst>
+      <p:par>
+        <p:cTn id="1" dur="indefinite" restart="never" nodeType="tmRoot"/>
+      </p:par>
+    </p:tnLst>
+  </p:timing>
 </p:sld>
 </file>
 
@@ -14770,6 +14974,13 @@
   <p:clrMapOvr>
     <a:masterClrMapping/>
   </p:clrMapOvr>
+  <p:timing>
+    <p:tnLst>
+      <p:par>
+        <p:cTn id="1" dur="indefinite" restart="never" nodeType="tmRoot"/>
+      </p:par>
+    </p:tnLst>
+  </p:timing>
 </p:sld>
 </file>
 
@@ -15434,6 +15645,13 @@
   <p:clrMapOvr>
     <a:masterClrMapping/>
   </p:clrMapOvr>
+  <p:timing>
+    <p:tnLst>
+      <p:par>
+        <p:cTn id="1" dur="indefinite" restart="never" nodeType="tmRoot"/>
+      </p:par>
+    </p:tnLst>
+  </p:timing>
 </p:sld>
 </file>
 
@@ -16195,6 +16413,13 @@
   <p:clrMapOvr>
     <a:masterClrMapping/>
   </p:clrMapOvr>
+  <p:timing>
+    <p:tnLst>
+      <p:par>
+        <p:cTn id="1" dur="indefinite" restart="never" nodeType="tmRoot"/>
+      </p:par>
+    </p:tnLst>
+  </p:timing>
 </p:sld>
 </file>
 
@@ -16694,6 +16919,178 @@
   <p:clrMapOvr>
     <a:masterClrMapping/>
   </p:clrMapOvr>
+  <p:timing>
+    <p:tnLst>
+      <p:par>
+        <p:cTn id="1" dur="indefinite" restart="never" nodeType="tmRoot">
+          <p:childTnLst>
+            <p:seq concurrent="1" nextAc="seek">
+              <p:cTn id="2" dur="indefinite" nodeType="mainSeq">
+                <p:childTnLst>
+                  <p:par>
+                    <p:cTn id="3" fill="hold">
+                      <p:stCondLst>
+                        <p:cond delay="indefinite"/>
+                      </p:stCondLst>
+                      <p:childTnLst>
+                        <p:par>
+                          <p:cTn id="4" fill="hold">
+                            <p:stCondLst>
+                              <p:cond delay="0"/>
+                            </p:stCondLst>
+                            <p:childTnLst>
+                              <p:par>
+                                <p:cTn id="5" presetID="1" presetClass="entr" presetSubtype="0" fill="hold" nodeType="clickEffect">
+                                  <p:stCondLst>
+                                    <p:cond delay="0"/>
+                                  </p:stCondLst>
+                                  <p:childTnLst>
+                                    <p:set>
+                                      <p:cBhvr>
+                                        <p:cTn id="6" dur="1" fill="hold">
+                                          <p:stCondLst>
+                                            <p:cond delay="0"/>
+                                          </p:stCondLst>
+                                        </p:cTn>
+                                        <p:tgtEl>
+                                          <p:spTgt spid="3">
+                                            <p:txEl>
+                                              <p:pRg st="1" end="1"/>
+                                            </p:txEl>
+                                          </p:spTgt>
+                                        </p:tgtEl>
+                                        <p:attrNameLst>
+                                          <p:attrName>style.visibility</p:attrName>
+                                        </p:attrNameLst>
+                                      </p:cBhvr>
+                                      <p:to>
+                                        <p:strVal val="visible"/>
+                                      </p:to>
+                                    </p:set>
+                                  </p:childTnLst>
+                                </p:cTn>
+                              </p:par>
+                              <p:par>
+                                <p:cTn id="7" presetID="1" presetClass="entr" presetSubtype="0" fill="hold" nodeType="withEffect">
+                                  <p:stCondLst>
+                                    <p:cond delay="0"/>
+                                  </p:stCondLst>
+                                  <p:childTnLst>
+                                    <p:set>
+                                      <p:cBhvr>
+                                        <p:cTn id="8" dur="1" fill="hold">
+                                          <p:stCondLst>
+                                            <p:cond delay="0"/>
+                                          </p:stCondLst>
+                                        </p:cTn>
+                                        <p:tgtEl>
+                                          <p:spTgt spid="3">
+                                            <p:txEl>
+                                              <p:pRg st="2" end="2"/>
+                                            </p:txEl>
+                                          </p:spTgt>
+                                        </p:tgtEl>
+                                        <p:attrNameLst>
+                                          <p:attrName>style.visibility</p:attrName>
+                                        </p:attrNameLst>
+                                      </p:cBhvr>
+                                      <p:to>
+                                        <p:strVal val="visible"/>
+                                      </p:to>
+                                    </p:set>
+                                  </p:childTnLst>
+                                </p:cTn>
+                              </p:par>
+                              <p:par>
+                                <p:cTn id="9" presetID="1" presetClass="entr" presetSubtype="0" fill="hold" nodeType="withEffect">
+                                  <p:stCondLst>
+                                    <p:cond delay="0"/>
+                                  </p:stCondLst>
+                                  <p:childTnLst>
+                                    <p:set>
+                                      <p:cBhvr>
+                                        <p:cTn id="10" dur="1" fill="hold">
+                                          <p:stCondLst>
+                                            <p:cond delay="0"/>
+                                          </p:stCondLst>
+                                        </p:cTn>
+                                        <p:tgtEl>
+                                          <p:spTgt spid="3">
+                                            <p:txEl>
+                                              <p:pRg st="3" end="3"/>
+                                            </p:txEl>
+                                          </p:spTgt>
+                                        </p:tgtEl>
+                                        <p:attrNameLst>
+                                          <p:attrName>style.visibility</p:attrName>
+                                        </p:attrNameLst>
+                                      </p:cBhvr>
+                                      <p:to>
+                                        <p:strVal val="visible"/>
+                                      </p:to>
+                                    </p:set>
+                                  </p:childTnLst>
+                                </p:cTn>
+                              </p:par>
+                              <p:par>
+                                <p:cTn id="11" presetID="1" presetClass="entr" presetSubtype="0" fill="hold" nodeType="withEffect">
+                                  <p:stCondLst>
+                                    <p:cond delay="0"/>
+                                  </p:stCondLst>
+                                  <p:childTnLst>
+                                    <p:set>
+                                      <p:cBhvr>
+                                        <p:cTn id="12" dur="1" fill="hold">
+                                          <p:stCondLst>
+                                            <p:cond delay="0"/>
+                                          </p:stCondLst>
+                                        </p:cTn>
+                                        <p:tgtEl>
+                                          <p:spTgt spid="3">
+                                            <p:txEl>
+                                              <p:pRg st="4" end="4"/>
+                                            </p:txEl>
+                                          </p:spTgt>
+                                        </p:tgtEl>
+                                        <p:attrNameLst>
+                                          <p:attrName>style.visibility</p:attrName>
+                                        </p:attrNameLst>
+                                      </p:cBhvr>
+                                      <p:to>
+                                        <p:strVal val="visible"/>
+                                      </p:to>
+                                    </p:set>
+                                  </p:childTnLst>
+                                </p:cTn>
+                              </p:par>
+                            </p:childTnLst>
+                          </p:cTn>
+                        </p:par>
+                      </p:childTnLst>
+                    </p:cTn>
+                  </p:par>
+                </p:childTnLst>
+              </p:cTn>
+              <p:prevCondLst>
+                <p:cond evt="onPrev" delay="0">
+                  <p:tgtEl>
+                    <p:sldTgt/>
+                  </p:tgtEl>
+                </p:cond>
+              </p:prevCondLst>
+              <p:nextCondLst>
+                <p:cond evt="onNext" delay="0">
+                  <p:tgtEl>
+                    <p:sldTgt/>
+                  </p:tgtEl>
+                </p:cond>
+              </p:nextCondLst>
+            </p:seq>
+          </p:childTnLst>
+        </p:cTn>
+      </p:par>
+    </p:tnLst>
+  </p:timing>
 </p:sld>
 </file>
 
@@ -16848,6 +17245,13 @@
   <p:clrMapOvr>
     <a:masterClrMapping/>
   </p:clrMapOvr>
+  <p:timing>
+    <p:tnLst>
+      <p:par>
+        <p:cTn id="1" dur="indefinite" restart="never" nodeType="tmRoot"/>
+      </p:par>
+    </p:tnLst>
+  </p:timing>
 </p:sld>
 </file>
 
@@ -17045,6 +17449,13 @@
   <p:clrMapOvr>
     <a:masterClrMapping/>
   </p:clrMapOvr>
+  <p:timing>
+    <p:tnLst>
+      <p:par>
+        <p:cTn id="1" dur="indefinite" restart="never" nodeType="tmRoot"/>
+      </p:par>
+    </p:tnLst>
+  </p:timing>
 </p:sld>
 </file>
 
@@ -17296,6 +17707,13 @@
   <p:clrMapOvr>
     <a:masterClrMapping/>
   </p:clrMapOvr>
+  <p:timing>
+    <p:tnLst>
+      <p:par>
+        <p:cTn id="1" dur="indefinite" restart="never" nodeType="tmRoot"/>
+      </p:par>
+    </p:tnLst>
+  </p:timing>
 </p:sld>
 </file>
 
@@ -17536,6 +17954,13 @@
   <p:clrMapOvr>
     <a:masterClrMapping/>
   </p:clrMapOvr>
+  <p:timing>
+    <p:tnLst>
+      <p:par>
+        <p:cTn id="1" dur="indefinite" restart="never" nodeType="tmRoot"/>
+      </p:par>
+    </p:tnLst>
+  </p:timing>
 </p:sld>
 </file>
 
@@ -17733,6 +18158,13 @@
   <p:clrMapOvr>
     <a:masterClrMapping/>
   </p:clrMapOvr>
+  <p:timing>
+    <p:tnLst>
+      <p:par>
+        <p:cTn id="1" dur="indefinite" restart="never" nodeType="tmRoot"/>
+      </p:par>
+    </p:tnLst>
+  </p:timing>
 </p:sld>
 </file>
 
@@ -17932,6 +18364,13 @@
   <p:clrMapOvr>
     <a:masterClrMapping/>
   </p:clrMapOvr>
+  <p:timing>
+    <p:tnLst>
+      <p:par>
+        <p:cTn id="1" dur="indefinite" restart="never" nodeType="tmRoot"/>
+      </p:par>
+    </p:tnLst>
+  </p:timing>
 </p:sld>
 </file>
 
@@ -18114,7 +18553,50 @@
                   <a:schemeClr val="tx1"/>
                 </a:solidFill>
               </a:rPr>
-              <a:t>Next week we discuss together your solutions </a:t>
+              <a:t>Next week we discuss together your </a:t>
+            </a:r>
+            <a:r>
+              <a:rPr lang="en-GB" i="1" dirty="0" smtClean="0">
+                <a:solidFill>
+                  <a:schemeClr val="tx1"/>
+                </a:solidFill>
+              </a:rPr>
+              <a:t>solutions</a:t>
+            </a:r>
+          </a:p>
+          <a:p>
+            <a:pPr lvl="1"/>
+            <a:r>
+              <a:rPr lang="en-GB" i="1" dirty="0" smtClean="0">
+                <a:solidFill>
+                  <a:schemeClr val="tx1"/>
+                </a:solidFill>
+              </a:rPr>
+              <a:t>Note: the general structure of the exam is in the </a:t>
+            </a:r>
+            <a:r>
+              <a:rPr lang="en-GB" i="1" dirty="0" err="1" smtClean="0">
+                <a:solidFill>
+                  <a:schemeClr val="tx1"/>
+                </a:solidFill>
+              </a:rPr>
+              <a:t>modulewijzer</a:t>
+            </a:r>
+            <a:r>
+              <a:rPr lang="en-GB" i="1" smtClean="0">
+                <a:solidFill>
+                  <a:schemeClr val="tx1"/>
+                </a:solidFill>
+              </a:rPr>
+              <a:t>… </a:t>
+            </a:r>
+            <a:r>
+              <a:rPr lang="en-GB" i="1" dirty="0" smtClean="0">
+                <a:solidFill>
+                  <a:schemeClr val="tx1"/>
+                </a:solidFill>
+              </a:rPr>
+              <a:t>take a look at it!</a:t>
             </a:r>
             <a:endParaRPr lang="nl-NL" dirty="0"/>
           </a:p>
@@ -18153,6 +18635,13 @@
   <p:clrMapOvr>
     <a:masterClrMapping/>
   </p:clrMapOvr>
+  <p:timing>
+    <p:tnLst>
+      <p:par>
+        <p:cTn id="1" dur="indefinite" restart="never" nodeType="tmRoot"/>
+      </p:par>
+    </p:tnLst>
+  </p:timing>
 </p:sld>
 </file>
 
@@ -18236,6 +18725,13 @@
   <p:clrMapOvr>
     <a:masterClrMapping/>
   </p:clrMapOvr>
+  <p:timing>
+    <p:tnLst>
+      <p:par>
+        <p:cTn id="1" dur="indefinite" restart="never" nodeType="tmRoot"/>
+      </p:par>
+    </p:tnLst>
+  </p:timing>
 </p:sld>
 </file>
 
@@ -18605,6 +19101,13 @@
   <p:clrMapOvr>
     <a:masterClrMapping/>
   </p:clrMapOvr>
+  <p:timing>
+    <p:tnLst>
+      <p:par>
+        <p:cTn id="1" dur="indefinite" restart="never" nodeType="tmRoot"/>
+      </p:par>
+    </p:tnLst>
+  </p:timing>
 </p:sld>
 </file>
 
@@ -18800,14 +19303,14 @@
                 <a:gridCol w="1211858">
                   <a:extLst>
                     <a:ext uri="{9D8B030D-6E8A-4147-A177-3AD203B41FA5}">
-                      <a16:colId xmlns:a16="http://schemas.microsoft.com/office/drawing/2014/main" val="3737604255"/>
+                      <a16:colId xmlns:a16="http://schemas.microsoft.com/office/drawing/2014/main" xmlns="" val="3737604255"/>
                     </a:ext>
                   </a:extLst>
                 </a:gridCol>
                 <a:gridCol w="2040674">
                   <a:extLst>
                     <a:ext uri="{9D8B030D-6E8A-4147-A177-3AD203B41FA5}">
-                      <a16:colId xmlns:a16="http://schemas.microsoft.com/office/drawing/2014/main" val="389226352"/>
+                      <a16:colId xmlns:a16="http://schemas.microsoft.com/office/drawing/2014/main" xmlns="" val="389226352"/>
                     </a:ext>
                   </a:extLst>
                 </a:gridCol>
@@ -18877,7 +19380,7 @@
                 </a:tc>
                 <a:extLst>
                   <a:ext uri="{0D108BD9-81ED-4DB2-BD59-A6C34878D82A}">
-                    <a16:rowId xmlns:a16="http://schemas.microsoft.com/office/drawing/2014/main" val="3883935320"/>
+                    <a16:rowId xmlns:a16="http://schemas.microsoft.com/office/drawing/2014/main" xmlns="" val="3883935320"/>
                   </a:ext>
                 </a:extLst>
               </a:tr>
@@ -18930,7 +19433,7 @@
                 </a:tc>
                 <a:extLst>
                   <a:ext uri="{0D108BD9-81ED-4DB2-BD59-A6C34878D82A}">
-                    <a16:rowId xmlns:a16="http://schemas.microsoft.com/office/drawing/2014/main" val="785959856"/>
+                    <a16:rowId xmlns:a16="http://schemas.microsoft.com/office/drawing/2014/main" xmlns="" val="785959856"/>
                   </a:ext>
                 </a:extLst>
               </a:tr>
@@ -18983,7 +19486,7 @@
                 </a:tc>
                 <a:extLst>
                   <a:ext uri="{0D108BD9-81ED-4DB2-BD59-A6C34878D82A}">
-                    <a16:rowId xmlns:a16="http://schemas.microsoft.com/office/drawing/2014/main" val="60468838"/>
+                    <a16:rowId xmlns:a16="http://schemas.microsoft.com/office/drawing/2014/main" xmlns="" val="60468838"/>
                   </a:ext>
                 </a:extLst>
               </a:tr>
@@ -19036,7 +19539,7 @@
                 </a:tc>
                 <a:extLst>
                   <a:ext uri="{0D108BD9-81ED-4DB2-BD59-A6C34878D82A}">
-                    <a16:rowId xmlns:a16="http://schemas.microsoft.com/office/drawing/2014/main" val="124635373"/>
+                    <a16:rowId xmlns:a16="http://schemas.microsoft.com/office/drawing/2014/main" xmlns="" val="124635373"/>
                   </a:ext>
                 </a:extLst>
               </a:tr>
@@ -19089,7 +19592,7 @@
                 </a:tc>
                 <a:extLst>
                   <a:ext uri="{0D108BD9-81ED-4DB2-BD59-A6C34878D82A}">
-                    <a16:rowId xmlns:a16="http://schemas.microsoft.com/office/drawing/2014/main" val="1501560492"/>
+                    <a16:rowId xmlns:a16="http://schemas.microsoft.com/office/drawing/2014/main" xmlns="" val="1501560492"/>
                   </a:ext>
                 </a:extLst>
               </a:tr>
@@ -19142,7 +19645,7 @@
                 </a:tc>
                 <a:extLst>
                   <a:ext uri="{0D108BD9-81ED-4DB2-BD59-A6C34878D82A}">
-                    <a16:rowId xmlns:a16="http://schemas.microsoft.com/office/drawing/2014/main" val="3751559142"/>
+                    <a16:rowId xmlns:a16="http://schemas.microsoft.com/office/drawing/2014/main" xmlns="" val="3751559142"/>
                   </a:ext>
                 </a:extLst>
               </a:tr>
@@ -19160,6 +19663,13 @@
   <p:clrMapOvr>
     <a:masterClrMapping/>
   </p:clrMapOvr>
+  <p:timing>
+    <p:tnLst>
+      <p:par>
+        <p:cTn id="1" dur="indefinite" restart="never" nodeType="tmRoot"/>
+      </p:par>
+    </p:tnLst>
+  </p:timing>
 </p:sld>
 </file>
 
@@ -20743,6 +21253,13 @@
   <p:clrMapOvr>
     <a:masterClrMapping/>
   </p:clrMapOvr>
+  <p:timing>
+    <p:tnLst>
+      <p:par>
+        <p:cTn id="1" dur="indefinite" restart="never" nodeType="tmRoot"/>
+      </p:par>
+    </p:tnLst>
+  </p:timing>
 </p:sld>
 </file>
 
@@ -20938,6 +21455,13 @@
   <p:clrMapOvr>
     <a:masterClrMapping/>
   </p:clrMapOvr>
+  <p:timing>
+    <p:tnLst>
+      <p:par>
+        <p:cTn id="1" dur="indefinite" restart="never" nodeType="tmRoot"/>
+      </p:par>
+    </p:tnLst>
+  </p:timing>
 </p:sld>
 </file>
 
@@ -21109,6 +21633,13 @@
   <p:clrMapOvr>
     <a:masterClrMapping/>
   </p:clrMapOvr>
+  <p:timing>
+    <p:tnLst>
+      <p:par>
+        <p:cTn id="1" dur="indefinite" restart="never" nodeType="tmRoot"/>
+      </p:par>
+    </p:tnLst>
+  </p:timing>
 </p:sld>
 </file>
 

</xml_diff>